<commit_message>
added plant disease notebook
</commit_message>
<xml_diff>
--- a/Docs/PPT_ED_SY_DIV-ICA_BATCH-B3_GRP-G5_DATE-201030_RN-65-66-67-68.pptx
+++ b/Docs/PPT_ED_SY_DIV-ICA_BATCH-B3_GRP-G5_DATE-201030_RN-65-66-67-68.pptx
@@ -5,7 +5,7 @@
     <p:sldMasterId id="2147483648" r:id="rId1"/>
   </p:sldMasterIdLst>
   <p:notesMasterIdLst>
-    <p:notesMasterId r:id="rId19"/>
+    <p:notesMasterId r:id="rId24"/>
   </p:notesMasterIdLst>
   <p:sldIdLst>
     <p:sldId id="1525" r:id="rId2"/>
@@ -17,14 +17,19 @@
     <p:sldId id="1533" r:id="rId8"/>
     <p:sldId id="1534" r:id="rId9"/>
     <p:sldId id="1539" r:id="rId10"/>
-    <p:sldId id="1524" r:id="rId11"/>
-    <p:sldId id="1526" r:id="rId12"/>
-    <p:sldId id="1527" r:id="rId13"/>
-    <p:sldId id="1528" r:id="rId14"/>
-    <p:sldId id="1529" r:id="rId15"/>
-    <p:sldId id="1531" r:id="rId16"/>
-    <p:sldId id="1532" r:id="rId17"/>
-    <p:sldId id="1530" r:id="rId18"/>
+    <p:sldId id="1540" r:id="rId11"/>
+    <p:sldId id="1524" r:id="rId12"/>
+    <p:sldId id="1541" r:id="rId13"/>
+    <p:sldId id="1542" r:id="rId14"/>
+    <p:sldId id="1543" r:id="rId15"/>
+    <p:sldId id="1544" r:id="rId16"/>
+    <p:sldId id="1526" r:id="rId17"/>
+    <p:sldId id="1527" r:id="rId18"/>
+    <p:sldId id="1528" r:id="rId19"/>
+    <p:sldId id="1529" r:id="rId20"/>
+    <p:sldId id="1531" r:id="rId21"/>
+    <p:sldId id="1532" r:id="rId22"/>
+    <p:sldId id="1530" r:id="rId23"/>
   </p:sldIdLst>
   <p:sldSz cx="9144000" cy="6858000" type="screen4x3"/>
   <p:notesSz cx="6858000" cy="9144000"/>
@@ -225,7 +230,7 @@
             <a:fld id="{3CA44751-DEF6-40E3-8526-EC9A0AE72A1D}" type="datetimeFigureOut">
               <a:rPr lang="en-US" smtClean="0"/>
               <a:pPr/>
-              <a:t>10/30/2020</a:t>
+              <a:t>1/8/2021</a:t>
             </a:fld>
             <a:endParaRPr lang="en-US"/>
           </a:p>
@@ -4167,54 +4172,6 @@
       </p:sp>
       <p:sp>
         <p:nvSpPr>
-          <p:cNvPr id="7" name="TextBox 6">
-            <a:extLst>
-              <a:ext uri="{FF2B5EF4-FFF2-40B4-BE49-F238E27FC236}">
-                <a16:creationId xmlns:a16="http://schemas.microsoft.com/office/drawing/2014/main" id="{CE674E32-7A29-496C-AAED-9D3511E24D63}"/>
-              </a:ext>
-            </a:extLst>
-          </p:cNvPr>
-          <p:cNvSpPr txBox="1"/>
-          <p:nvPr/>
-        </p:nvSpPr>
-        <p:spPr>
-          <a:xfrm>
-            <a:off x="609600" y="751888"/>
-            <a:ext cx="7219950" cy="1663661"/>
-          </a:xfrm>
-          <a:prstGeom prst="rect">
-            <a:avLst/>
-          </a:prstGeom>
-          <a:noFill/>
-        </p:spPr>
-        <p:txBody>
-          <a:bodyPr wrap="square" rtlCol="0">
-            <a:spAutoFit/>
-          </a:bodyPr>
-          <a:lstStyle/>
-          <a:p>
-            <a:pPr marL="342900" indent="-342900">
-              <a:lnSpc>
-                <a:spcPct val="200000"/>
-              </a:lnSpc>
-              <a:buFont typeface="Arial" panose="020B0604020202020204" pitchFamily="34" charset="0"/>
-              <a:buChar char="•"/>
-            </a:pPr>
-            <a:r>
-              <a:rPr lang="en-IN" dirty="0">
-                <a:solidFill>
-                  <a:srgbClr val="C00000"/>
-                </a:solidFill>
-                <a:latin typeface="Verdana" panose="020B0604030504040204" pitchFamily="34" charset="0"/>
-                <a:ea typeface="Verdana" panose="020B0604030504040204" pitchFamily="34" charset="0"/>
-              </a:rPr>
-              <a:t>Parameters used for determining the crop and fertilizer to use includes Nitrogen, Phosphorous, Potassium, temperature, humidity, ph and rainfall</a:t>
-            </a:r>
-          </a:p>
-        </p:txBody>
-      </p:sp>
-      <p:sp>
-        <p:nvSpPr>
           <p:cNvPr id="6" name="Slide Number Placeholder 3">
             <a:extLst>
               <a:ext uri="{FF2B5EF4-FFF2-40B4-BE49-F238E27FC236}">
@@ -4262,40 +4219,147 @@
           </a:p>
         </p:txBody>
       </p:sp>
-      <p:pic>
-        <p:nvPicPr>
-          <p:cNvPr id="4" name="Picture 3">
+      <p:sp>
+        <p:nvSpPr>
+          <p:cNvPr id="2" name="TextBox 1">
             <a:extLst>
               <a:ext uri="{FF2B5EF4-FFF2-40B4-BE49-F238E27FC236}">
-                <a16:creationId xmlns:a16="http://schemas.microsoft.com/office/drawing/2014/main" id="{80B94183-5A1B-421C-913B-BEA9BED18C15}"/>
+                <a16:creationId xmlns:a16="http://schemas.microsoft.com/office/drawing/2014/main" id="{89E9753A-F953-4C83-AAA5-E8BB4D499112}"/>
               </a:ext>
             </a:extLst>
           </p:cNvPr>
-          <p:cNvPicPr>
-            <a:picLocks noChangeAspect="1"/>
-          </p:cNvPicPr>
+          <p:cNvSpPr txBox="1"/>
           <p:nvPr/>
-        </p:nvPicPr>
-        <p:blipFill>
-          <a:blip r:embed="rId2"/>
-          <a:stretch>
-            <a:fillRect/>
-          </a:stretch>
-        </p:blipFill>
+        </p:nvSpPr>
         <p:spPr>
           <a:xfrm>
-            <a:off x="1311628" y="3048000"/>
-            <a:ext cx="6510746" cy="2503250"/>
+            <a:off x="1901043" y="1079650"/>
+            <a:ext cx="5570513" cy="461665"/>
           </a:xfrm>
           <a:prstGeom prst="rect">
             <a:avLst/>
           </a:prstGeom>
+          <a:noFill/>
         </p:spPr>
-      </p:pic>
+        <p:txBody>
+          <a:bodyPr wrap="square" rtlCol="0">
+            <a:spAutoFit/>
+          </a:bodyPr>
+          <a:lstStyle/>
+          <a:p>
+            <a:r>
+              <a:rPr lang="en-US" sz="2400" b="1" dirty="0">
+                <a:latin typeface="Bahnschrift" panose="020B0502040204020203" pitchFamily="34" charset="0"/>
+              </a:rPr>
+              <a:t>CROP RECOMMENDATION SYSTEM</a:t>
+            </a:r>
+          </a:p>
+        </p:txBody>
+      </p:sp>
+      <p:sp>
+        <p:nvSpPr>
+          <p:cNvPr id="5" name="TextBox 4">
+            <a:extLst>
+              <a:ext uri="{FF2B5EF4-FFF2-40B4-BE49-F238E27FC236}">
+                <a16:creationId xmlns:a16="http://schemas.microsoft.com/office/drawing/2014/main" id="{64265DB3-A056-4131-92D4-44C69C10F3DF}"/>
+              </a:ext>
+            </a:extLst>
+          </p:cNvPr>
+          <p:cNvSpPr txBox="1"/>
+          <p:nvPr/>
+        </p:nvSpPr>
+        <p:spPr>
+          <a:xfrm>
+            <a:off x="1076324" y="1981200"/>
+            <a:ext cx="6991350" cy="4508927"/>
+          </a:xfrm>
+          <a:prstGeom prst="rect">
+            <a:avLst/>
+          </a:prstGeom>
+          <a:noFill/>
+        </p:spPr>
+        <p:txBody>
+          <a:bodyPr wrap="square" rtlCol="0">
+            <a:spAutoFit/>
+          </a:bodyPr>
+          <a:lstStyle/>
+          <a:p>
+            <a:r>
+              <a:rPr lang="en-US" sz="2300" b="1" dirty="0">
+                <a:latin typeface="Verdana" panose="020B0604030504040204" pitchFamily="34" charset="0"/>
+                <a:ea typeface="Verdana" panose="020B0604030504040204" pitchFamily="34" charset="0"/>
+              </a:rPr>
+              <a:t>Goal : </a:t>
+            </a:r>
+          </a:p>
+          <a:p>
+            <a:endParaRPr lang="en-US" sz="2200" b="1" dirty="0">
+              <a:latin typeface="Verdana" panose="020B0604030504040204" pitchFamily="34" charset="0"/>
+              <a:ea typeface="Verdana" panose="020B0604030504040204" pitchFamily="34" charset="0"/>
+            </a:endParaRPr>
+          </a:p>
+          <a:p>
+            <a:r>
+              <a:rPr lang="en-US" sz="2200" dirty="0">
+                <a:latin typeface="Verdana" panose="020B0604030504040204" pitchFamily="34" charset="0"/>
+                <a:ea typeface="Verdana" panose="020B0604030504040204" pitchFamily="34" charset="0"/>
+              </a:rPr>
+              <a:t>To determine the most optimal crops which farmer can grow based on certain weather and soil parameters</a:t>
+            </a:r>
+          </a:p>
+          <a:p>
+            <a:endParaRPr lang="en-US" sz="2200" dirty="0">
+              <a:latin typeface="Verdana" panose="020B0604030504040204" pitchFamily="34" charset="0"/>
+              <a:ea typeface="Verdana" panose="020B0604030504040204" pitchFamily="34" charset="0"/>
+            </a:endParaRPr>
+          </a:p>
+          <a:p>
+            <a:r>
+              <a:rPr lang="en-IN" sz="2200" dirty="0">
+                <a:latin typeface="Verdana" panose="020B0604030504040204" pitchFamily="34" charset="0"/>
+                <a:ea typeface="Verdana" panose="020B0604030504040204" pitchFamily="34" charset="0"/>
+              </a:rPr>
+              <a:t>Parameters used for determining the optimal crop to grow includes Nitrogen, Phosphorous, Potassium, temperature, humidity, </a:t>
+            </a:r>
+            <a:r>
+              <a:rPr lang="en-IN" sz="2200" dirty="0" err="1">
+                <a:latin typeface="Verdana" panose="020B0604030504040204" pitchFamily="34" charset="0"/>
+                <a:ea typeface="Verdana" panose="020B0604030504040204" pitchFamily="34" charset="0"/>
+              </a:rPr>
+              <a:t>ph</a:t>
+            </a:r>
+            <a:r>
+              <a:rPr lang="en-IN" sz="2200" dirty="0">
+                <a:latin typeface="Verdana" panose="020B0604030504040204" pitchFamily="34" charset="0"/>
+                <a:ea typeface="Verdana" panose="020B0604030504040204" pitchFamily="34" charset="0"/>
+              </a:rPr>
+              <a:t> and rainfall.</a:t>
+            </a:r>
+          </a:p>
+          <a:p>
+            <a:endParaRPr lang="en-US" sz="2200" dirty="0">
+              <a:latin typeface="Verdana" panose="020B0604030504040204" pitchFamily="34" charset="0"/>
+              <a:ea typeface="Verdana" panose="020B0604030504040204" pitchFamily="34" charset="0"/>
+            </a:endParaRPr>
+          </a:p>
+          <a:p>
+            <a:endParaRPr lang="en-US" sz="2200" dirty="0">
+              <a:latin typeface="Verdana" panose="020B0604030504040204" pitchFamily="34" charset="0"/>
+              <a:ea typeface="Verdana" panose="020B0604030504040204" pitchFamily="34" charset="0"/>
+            </a:endParaRPr>
+          </a:p>
+          <a:p>
+            <a:endParaRPr lang="en-US" sz="2200" dirty="0">
+              <a:latin typeface="Verdana" panose="020B0604030504040204" pitchFamily="34" charset="0"/>
+              <a:ea typeface="Verdana" panose="020B0604030504040204" pitchFamily="34" charset="0"/>
+            </a:endParaRPr>
+          </a:p>
+        </p:txBody>
+      </p:sp>
     </p:spTree>
     <p:extLst>
       <p:ext uri="{BB962C8B-B14F-4D97-AF65-F5344CB8AC3E}">
-        <p14:creationId xmlns:p14="http://schemas.microsoft.com/office/powerpoint/2010/main" val="2992229537"/>
+        <p14:creationId xmlns:p14="http://schemas.microsoft.com/office/powerpoint/2010/main" val="780090106"/>
       </p:ext>
     </p:extLst>
   </p:cSld>
@@ -4534,92 +4598,6 @@
       </p:sp>
       <p:sp>
         <p:nvSpPr>
-          <p:cNvPr id="7" name="TextBox 6">
-            <a:extLst>
-              <a:ext uri="{FF2B5EF4-FFF2-40B4-BE49-F238E27FC236}">
-                <a16:creationId xmlns:a16="http://schemas.microsoft.com/office/drawing/2014/main" id="{CE674E32-7A29-496C-AAED-9D3511E24D63}"/>
-              </a:ext>
-            </a:extLst>
-          </p:cNvPr>
-          <p:cNvSpPr txBox="1"/>
-          <p:nvPr/>
-        </p:nvSpPr>
-        <p:spPr>
-          <a:xfrm>
-            <a:off x="838200" y="1447800"/>
-            <a:ext cx="8305800" cy="3664786"/>
-          </a:xfrm>
-          <a:prstGeom prst="rect">
-            <a:avLst/>
-          </a:prstGeom>
-          <a:noFill/>
-        </p:spPr>
-        <p:txBody>
-          <a:bodyPr wrap="square" rtlCol="0">
-            <a:spAutoFit/>
-          </a:bodyPr>
-          <a:lstStyle/>
-          <a:p>
-            <a:pPr marL="342900" indent="-342900">
-              <a:lnSpc>
-                <a:spcPct val="200000"/>
-              </a:lnSpc>
-              <a:buFont typeface="Arial" panose="020B0604020202020204" pitchFamily="34" charset="0"/>
-              <a:buChar char="•"/>
-            </a:pPr>
-            <a:r>
-              <a:rPr lang="en-IN" sz="2400" dirty="0">
-                <a:solidFill>
-                  <a:srgbClr val="002060"/>
-                </a:solidFill>
-                <a:latin typeface="Verdana" panose="020B0604030504040204" pitchFamily="34" charset="0"/>
-                <a:ea typeface="Verdana" panose="020B0604030504040204" pitchFamily="34" charset="0"/>
-              </a:rPr>
-              <a:t>Plant disease prediction using images of diseased plant leaves</a:t>
-            </a:r>
-          </a:p>
-          <a:p>
-            <a:pPr marL="342900" indent="-342900">
-              <a:lnSpc>
-                <a:spcPct val="200000"/>
-              </a:lnSpc>
-              <a:buFont typeface="Arial" panose="020B0604020202020204" pitchFamily="34" charset="0"/>
-              <a:buChar char="•"/>
-            </a:pPr>
-            <a:r>
-              <a:rPr lang="en-IN" sz="2400" dirty="0">
-                <a:solidFill>
-                  <a:srgbClr val="002060"/>
-                </a:solidFill>
-                <a:latin typeface="Verdana" panose="020B0604030504040204" pitchFamily="34" charset="0"/>
-                <a:ea typeface="Verdana" panose="020B0604030504040204" pitchFamily="34" charset="0"/>
-              </a:rPr>
-              <a:t>Augmented data of 15 plants having 88,000 rgb images and 38 classes</a:t>
-            </a:r>
-          </a:p>
-          <a:p>
-            <a:pPr marL="342900" indent="-342900">
-              <a:lnSpc>
-                <a:spcPct val="200000"/>
-              </a:lnSpc>
-              <a:buFont typeface="Arial" panose="020B0604020202020204" pitchFamily="34" charset="0"/>
-              <a:buChar char="•"/>
-            </a:pPr>
-            <a:r>
-              <a:rPr lang="en-IN" sz="2400" dirty="0">
-                <a:solidFill>
-                  <a:srgbClr val="002060"/>
-                </a:solidFill>
-                <a:latin typeface="Verdana" panose="020B0604030504040204" pitchFamily="34" charset="0"/>
-                <a:ea typeface="Verdana" panose="020B0604030504040204" pitchFamily="34" charset="0"/>
-              </a:rPr>
-              <a:t>CNN based model</a:t>
-            </a:r>
-          </a:p>
-        </p:txBody>
-      </p:sp>
-      <p:sp>
-        <p:nvSpPr>
           <p:cNvPr id="6" name="Slide Number Placeholder 3">
             <a:extLst>
               <a:ext uri="{FF2B5EF4-FFF2-40B4-BE49-F238E27FC236}">
@@ -4667,10 +4645,112 @@
           </a:p>
         </p:txBody>
       </p:sp>
+      <p:pic>
+        <p:nvPicPr>
+          <p:cNvPr id="4" name="Picture 3">
+            <a:extLst>
+              <a:ext uri="{FF2B5EF4-FFF2-40B4-BE49-F238E27FC236}">
+                <a16:creationId xmlns:a16="http://schemas.microsoft.com/office/drawing/2014/main" id="{80B94183-5A1B-421C-913B-BEA9BED18C15}"/>
+              </a:ext>
+            </a:extLst>
+          </p:cNvPr>
+          <p:cNvPicPr>
+            <a:picLocks noChangeAspect="1"/>
+          </p:cNvPicPr>
+          <p:nvPr/>
+        </p:nvPicPr>
+        <p:blipFill>
+          <a:blip r:embed="rId2"/>
+          <a:stretch>
+            <a:fillRect/>
+          </a:stretch>
+        </p:blipFill>
+        <p:spPr>
+          <a:xfrm>
+            <a:off x="1287897" y="2120225"/>
+            <a:ext cx="6510746" cy="2503250"/>
+          </a:xfrm>
+          <a:prstGeom prst="rect">
+            <a:avLst/>
+          </a:prstGeom>
+        </p:spPr>
+      </p:pic>
+      <p:sp>
+        <p:nvSpPr>
+          <p:cNvPr id="2" name="TextBox 1">
+            <a:extLst>
+              <a:ext uri="{FF2B5EF4-FFF2-40B4-BE49-F238E27FC236}">
+                <a16:creationId xmlns:a16="http://schemas.microsoft.com/office/drawing/2014/main" id="{89E9753A-F953-4C83-AAA5-E8BB4D499112}"/>
+              </a:ext>
+            </a:extLst>
+          </p:cNvPr>
+          <p:cNvSpPr txBox="1"/>
+          <p:nvPr/>
+        </p:nvSpPr>
+        <p:spPr>
+          <a:xfrm>
+            <a:off x="1901043" y="1012529"/>
+            <a:ext cx="5570513" cy="461665"/>
+          </a:xfrm>
+          <a:prstGeom prst="rect">
+            <a:avLst/>
+          </a:prstGeom>
+          <a:noFill/>
+        </p:spPr>
+        <p:txBody>
+          <a:bodyPr wrap="square" rtlCol="0">
+            <a:spAutoFit/>
+          </a:bodyPr>
+          <a:lstStyle/>
+          <a:p>
+            <a:r>
+              <a:rPr lang="en-US" sz="2400" b="1" dirty="0">
+                <a:latin typeface="Bahnschrift" panose="020B0502040204020203" pitchFamily="34" charset="0"/>
+              </a:rPr>
+              <a:t>CROP RECOMMENDATION SYSTEM</a:t>
+            </a:r>
+          </a:p>
+        </p:txBody>
+      </p:sp>
+      <p:sp>
+        <p:nvSpPr>
+          <p:cNvPr id="5" name="TextBox 4">
+            <a:extLst>
+              <a:ext uri="{FF2B5EF4-FFF2-40B4-BE49-F238E27FC236}">
+                <a16:creationId xmlns:a16="http://schemas.microsoft.com/office/drawing/2014/main" id="{9DFA6CD0-0DE5-4D38-B1BA-46FC2FF6820E}"/>
+              </a:ext>
+            </a:extLst>
+          </p:cNvPr>
+          <p:cNvSpPr txBox="1"/>
+          <p:nvPr/>
+        </p:nvSpPr>
+        <p:spPr>
+          <a:xfrm>
+            <a:off x="1914525" y="4630509"/>
+            <a:ext cx="5314950" cy="369332"/>
+          </a:xfrm>
+          <a:prstGeom prst="rect">
+            <a:avLst/>
+          </a:prstGeom>
+          <a:noFill/>
+        </p:spPr>
+        <p:txBody>
+          <a:bodyPr wrap="square" rtlCol="0">
+            <a:spAutoFit/>
+          </a:bodyPr>
+          <a:lstStyle/>
+          <a:p>
+            <a:r>
+              <a:rPr lang="en-US" dirty="0"/>
+              <a:t>First five rows of data used for predictive modelling</a:t>
+            </a:r>
+          </a:p>
+        </p:txBody>
+      </p:sp>
     </p:spTree>
     <p:extLst>
       <p:ext uri="{BB962C8B-B14F-4D97-AF65-F5344CB8AC3E}">
-        <p14:creationId xmlns:p14="http://schemas.microsoft.com/office/powerpoint/2010/main" val="3695189511"/>
+        <p14:creationId xmlns:p14="http://schemas.microsoft.com/office/powerpoint/2010/main" val="2992229537"/>
       </p:ext>
     </p:extLst>
   </p:cSld>
@@ -4902,7 +4982,7 @@
                 <a:latin typeface="Verdana" panose="020B0604030504040204" pitchFamily="34" charset="0"/>
                 <a:ea typeface="Verdana" panose="020B0604030504040204" pitchFamily="34" charset="0"/>
               </a:rPr>
-              <a:t>Only Image slide</a:t>
+              <a:t>Description</a:t>
             </a:r>
           </a:p>
         </p:txBody>
@@ -4945,6 +5025,1776 @@
                 <a:defRPr/>
               </a:pPr>
               <a:t>12</a:t>
+            </a:fld>
+            <a:r>
+              <a:rPr lang="en-US" dirty="0">
+                <a:latin typeface="Verdana" panose="020B0604030504040204" pitchFamily="34" charset="0"/>
+                <a:ea typeface="Verdana" panose="020B0604030504040204" pitchFamily="34" charset="0"/>
+              </a:rPr>
+              <a:t> </a:t>
+            </a:r>
+          </a:p>
+        </p:txBody>
+      </p:sp>
+      <p:sp>
+        <p:nvSpPr>
+          <p:cNvPr id="2" name="TextBox 1">
+            <a:extLst>
+              <a:ext uri="{FF2B5EF4-FFF2-40B4-BE49-F238E27FC236}">
+                <a16:creationId xmlns:a16="http://schemas.microsoft.com/office/drawing/2014/main" id="{89E9753A-F953-4C83-AAA5-E8BB4D499112}"/>
+              </a:ext>
+            </a:extLst>
+          </p:cNvPr>
+          <p:cNvSpPr txBox="1"/>
+          <p:nvPr/>
+        </p:nvSpPr>
+        <p:spPr>
+          <a:xfrm>
+            <a:off x="1901043" y="1012529"/>
+            <a:ext cx="5570513" cy="461665"/>
+          </a:xfrm>
+          <a:prstGeom prst="rect">
+            <a:avLst/>
+          </a:prstGeom>
+          <a:noFill/>
+        </p:spPr>
+        <p:txBody>
+          <a:bodyPr wrap="square" rtlCol="0">
+            <a:spAutoFit/>
+          </a:bodyPr>
+          <a:lstStyle/>
+          <a:p>
+            <a:r>
+              <a:rPr lang="en-US" sz="2400" b="1" dirty="0">
+                <a:latin typeface="Bahnschrift" panose="020B0502040204020203" pitchFamily="34" charset="0"/>
+              </a:rPr>
+              <a:t>CROP RECOMMENDATION SYSTEM</a:t>
+            </a:r>
+          </a:p>
+        </p:txBody>
+      </p:sp>
+    </p:spTree>
+    <p:extLst>
+      <p:ext uri="{BB962C8B-B14F-4D97-AF65-F5344CB8AC3E}">
+        <p14:creationId xmlns:p14="http://schemas.microsoft.com/office/powerpoint/2010/main" val="899965504"/>
+      </p:ext>
+    </p:extLst>
+  </p:cSld>
+  <p:clrMapOvr>
+    <a:masterClrMapping/>
+  </p:clrMapOvr>
+  <p:timing>
+    <p:tnLst>
+      <p:par>
+        <p:cTn id="1" dur="indefinite" restart="never" nodeType="tmRoot">
+          <p:childTnLst>
+            <p:seq concurrent="1" nextAc="seek">
+              <p:cTn id="2" dur="indefinite" nodeType="mainSeq">
+                <p:childTnLst>
+                  <p:par>
+                    <p:cTn id="3" fill="hold">
+                      <p:stCondLst>
+                        <p:cond delay="indefinite"/>
+                      </p:stCondLst>
+                      <p:childTnLst>
+                        <p:par>
+                          <p:cTn id="4" fill="hold">
+                            <p:stCondLst>
+                              <p:cond delay="0"/>
+                            </p:stCondLst>
+                            <p:childTnLst>
+                              <p:par>
+                                <p:cTn id="5" presetID="2" presetClass="entr" presetSubtype="8" fill="hold" grpId="0" nodeType="clickEffect" nodePh="1">
+                                  <p:stCondLst>
+                                    <p:cond delay="0"/>
+                                  </p:stCondLst>
+                                  <p:endCondLst>
+                                    <p:cond evt="begin" delay="0">
+                                      <p:tn val="5"/>
+                                    </p:cond>
+                                  </p:endCondLst>
+                                  <p:childTnLst>
+                                    <p:set>
+                                      <p:cBhvr>
+                                        <p:cTn id="6" dur="1" fill="hold">
+                                          <p:stCondLst>
+                                            <p:cond delay="0"/>
+                                          </p:stCondLst>
+                                        </p:cTn>
+                                        <p:tgtEl>
+                                          <p:spTgt spid="18">
+                                            <p:txEl>
+                                              <p:pRg st="0" end="0"/>
+                                            </p:txEl>
+                                          </p:spTgt>
+                                        </p:tgtEl>
+                                        <p:attrNameLst>
+                                          <p:attrName>style.visibility</p:attrName>
+                                        </p:attrNameLst>
+                                      </p:cBhvr>
+                                      <p:to>
+                                        <p:strVal val="visible"/>
+                                      </p:to>
+                                    </p:set>
+                                    <p:anim calcmode="lin" valueType="num">
+                                      <p:cBhvr additive="base">
+                                        <p:cTn id="7" dur="500" fill="hold"/>
+                                        <p:tgtEl>
+                                          <p:spTgt spid="18">
+                                            <p:txEl>
+                                              <p:pRg st="0" end="0"/>
+                                            </p:txEl>
+                                          </p:spTgt>
+                                        </p:tgtEl>
+                                        <p:attrNameLst>
+                                          <p:attrName>ppt_x</p:attrName>
+                                        </p:attrNameLst>
+                                      </p:cBhvr>
+                                      <p:tavLst>
+                                        <p:tav tm="0">
+                                          <p:val>
+                                            <p:strVal val="0-#ppt_w/2"/>
+                                          </p:val>
+                                        </p:tav>
+                                        <p:tav tm="100000">
+                                          <p:val>
+                                            <p:strVal val="#ppt_x"/>
+                                          </p:val>
+                                        </p:tav>
+                                      </p:tavLst>
+                                    </p:anim>
+                                    <p:anim calcmode="lin" valueType="num">
+                                      <p:cBhvr additive="base">
+                                        <p:cTn id="8" dur="500" fill="hold"/>
+                                        <p:tgtEl>
+                                          <p:spTgt spid="18">
+                                            <p:txEl>
+                                              <p:pRg st="0" end="0"/>
+                                            </p:txEl>
+                                          </p:spTgt>
+                                        </p:tgtEl>
+                                        <p:attrNameLst>
+                                          <p:attrName>ppt_y</p:attrName>
+                                        </p:attrNameLst>
+                                      </p:cBhvr>
+                                      <p:tavLst>
+                                        <p:tav tm="0">
+                                          <p:val>
+                                            <p:strVal val="#ppt_y"/>
+                                          </p:val>
+                                        </p:tav>
+                                        <p:tav tm="100000">
+                                          <p:val>
+                                            <p:strVal val="#ppt_y"/>
+                                          </p:val>
+                                        </p:tav>
+                                      </p:tavLst>
+                                    </p:anim>
+                                  </p:childTnLst>
+                                </p:cTn>
+                              </p:par>
+                            </p:childTnLst>
+                          </p:cTn>
+                        </p:par>
+                      </p:childTnLst>
+                    </p:cTn>
+                  </p:par>
+                </p:childTnLst>
+              </p:cTn>
+              <p:prevCondLst>
+                <p:cond evt="onPrev" delay="0">
+                  <p:tgtEl>
+                    <p:sldTgt/>
+                  </p:tgtEl>
+                </p:cond>
+              </p:prevCondLst>
+              <p:nextCondLst>
+                <p:cond evt="onNext" delay="0">
+                  <p:tgtEl>
+                    <p:sldTgt/>
+                  </p:tgtEl>
+                </p:cond>
+              </p:nextCondLst>
+            </p:seq>
+          </p:childTnLst>
+        </p:cTn>
+      </p:par>
+    </p:tnLst>
+    <p:bldLst>
+      <p:bldP spid="18" grpId="0" build="p" autoUpdateAnimBg="0"/>
+    </p:bldLst>
+  </p:timing>
+</p:sld>
+</file>
+
+<file path=ppt/slides/slide13.xml><?xml version="1.0" encoding="utf-8"?>
+<p:sld xmlns:a="http://schemas.openxmlformats.org/drawingml/2006/main" xmlns:r="http://schemas.openxmlformats.org/officeDocument/2006/relationships" xmlns:p="http://schemas.openxmlformats.org/presentationml/2006/main">
+  <p:cSld>
+    <p:spTree>
+      <p:nvGrpSpPr>
+        <p:cNvPr id="1" name=""/>
+        <p:cNvGrpSpPr/>
+        <p:nvPr/>
+      </p:nvGrpSpPr>
+      <p:grpSpPr>
+        <a:xfrm>
+          <a:off x="0" y="0"/>
+          <a:ext cx="0" cy="0"/>
+          <a:chOff x="0" y="0"/>
+          <a:chExt cx="0" cy="0"/>
+        </a:xfrm>
+      </p:grpSpPr>
+      <p:sp>
+        <p:nvSpPr>
+          <p:cNvPr id="18" name="Rectangle 3"/>
+          <p:cNvSpPr txBox="1">
+            <a:spLocks noChangeArrowheads="1"/>
+          </p:cNvSpPr>
+          <p:nvPr/>
+        </p:nvSpPr>
+        <p:spPr>
+          <a:xfrm>
+            <a:off x="1543050" y="3371850"/>
+            <a:ext cx="6286500" cy="342900"/>
+          </a:xfrm>
+          <a:prstGeom prst="rect">
+            <a:avLst/>
+          </a:prstGeom>
+        </p:spPr>
+        <p:txBody>
+          <a:bodyPr/>
+          <a:lstStyle/>
+          <a:p>
+            <a:pPr algn="ctr" eaLnBrk="0" fontAlgn="base" hangingPunct="0">
+              <a:spcBef>
+                <a:spcPct val="20000"/>
+              </a:spcBef>
+              <a:spcAft>
+                <a:spcPct val="20000"/>
+              </a:spcAft>
+              <a:defRPr/>
+            </a:pPr>
+            <a:endParaRPr lang="en-US" sz="3600" dirty="0">
+              <a:sym typeface="Symbol" pitchFamily="18" charset="2"/>
+            </a:endParaRPr>
+          </a:p>
+        </p:txBody>
+      </p:sp>
+      <p:sp>
+        <p:nvSpPr>
+          <p:cNvPr id="3" name="Title 2">
+            <a:extLst>
+              <a:ext uri="{FF2B5EF4-FFF2-40B4-BE49-F238E27FC236}">
+                <a16:creationId xmlns:a16="http://schemas.microsoft.com/office/drawing/2014/main" id="{7CBEB6BF-435C-4050-8916-C2A3F4028ED5}"/>
+              </a:ext>
+            </a:extLst>
+          </p:cNvPr>
+          <p:cNvSpPr>
+            <a:spLocks noGrp="1"/>
+          </p:cNvSpPr>
+          <p:nvPr>
+            <p:ph type="title"/>
+          </p:nvPr>
+        </p:nvSpPr>
+        <p:spPr/>
+        <p:txBody>
+          <a:bodyPr>
+            <a:normAutofit/>
+          </a:bodyPr>
+          <a:lstStyle/>
+          <a:p>
+            <a:r>
+              <a:rPr lang="en-IN" sz="2800" dirty="0">
+                <a:latin typeface="Verdana" panose="020B0604030504040204" pitchFamily="34" charset="0"/>
+                <a:ea typeface="Verdana" panose="020B0604030504040204" pitchFamily="34" charset="0"/>
+              </a:rPr>
+              <a:t>Description</a:t>
+            </a:r>
+          </a:p>
+        </p:txBody>
+      </p:sp>
+      <p:sp>
+        <p:nvSpPr>
+          <p:cNvPr id="6" name="Slide Number Placeholder 3">
+            <a:extLst>
+              <a:ext uri="{FF2B5EF4-FFF2-40B4-BE49-F238E27FC236}">
+                <a16:creationId xmlns:a16="http://schemas.microsoft.com/office/drawing/2014/main" id="{8582021D-08E8-4879-942F-0C8B29BE02D7}"/>
+              </a:ext>
+            </a:extLst>
+          </p:cNvPr>
+          <p:cNvSpPr>
+            <a:spLocks noGrp="1"/>
+          </p:cNvSpPr>
+          <p:nvPr>
+            <p:ph type="sldNum" sz="quarter" idx="12"/>
+          </p:nvPr>
+        </p:nvSpPr>
+        <p:spPr>
+          <a:xfrm>
+            <a:off x="7391400" y="6477000"/>
+            <a:ext cx="1600200" cy="195263"/>
+          </a:xfrm>
+        </p:spPr>
+        <p:txBody>
+          <a:bodyPr/>
+          <a:lstStyle/>
+          <a:p>
+            <a:pPr>
+              <a:defRPr/>
+            </a:pPr>
+            <a:fld id="{02246FD1-0723-4B2F-9706-10282F2BA698}" type="slidenum">
+              <a:rPr lang="en-US" smtClean="0">
+                <a:latin typeface="Verdana" panose="020B0604030504040204" pitchFamily="34" charset="0"/>
+                <a:ea typeface="Verdana" panose="020B0604030504040204" pitchFamily="34" charset="0"/>
+              </a:rPr>
+              <a:pPr>
+                <a:defRPr/>
+              </a:pPr>
+              <a:t>13</a:t>
+            </a:fld>
+            <a:r>
+              <a:rPr lang="en-US" dirty="0">
+                <a:latin typeface="Verdana" panose="020B0604030504040204" pitchFamily="34" charset="0"/>
+                <a:ea typeface="Verdana" panose="020B0604030504040204" pitchFamily="34" charset="0"/>
+              </a:rPr>
+              <a:t> </a:t>
+            </a:r>
+          </a:p>
+        </p:txBody>
+      </p:sp>
+      <p:sp>
+        <p:nvSpPr>
+          <p:cNvPr id="2" name="TextBox 1">
+            <a:extLst>
+              <a:ext uri="{FF2B5EF4-FFF2-40B4-BE49-F238E27FC236}">
+                <a16:creationId xmlns:a16="http://schemas.microsoft.com/office/drawing/2014/main" id="{89E9753A-F953-4C83-AAA5-E8BB4D499112}"/>
+              </a:ext>
+            </a:extLst>
+          </p:cNvPr>
+          <p:cNvSpPr txBox="1"/>
+          <p:nvPr/>
+        </p:nvSpPr>
+        <p:spPr>
+          <a:xfrm>
+            <a:off x="1901043" y="1012529"/>
+            <a:ext cx="5570513" cy="461665"/>
+          </a:xfrm>
+          <a:prstGeom prst="rect">
+            <a:avLst/>
+          </a:prstGeom>
+          <a:noFill/>
+        </p:spPr>
+        <p:txBody>
+          <a:bodyPr wrap="square" rtlCol="0">
+            <a:spAutoFit/>
+          </a:bodyPr>
+          <a:lstStyle/>
+          <a:p>
+            <a:r>
+              <a:rPr lang="en-US" sz="2400" b="1" dirty="0">
+                <a:latin typeface="Bahnschrift" panose="020B0502040204020203" pitchFamily="34" charset="0"/>
+              </a:rPr>
+              <a:t>CROP RECOMMENDATION SYSTEM</a:t>
+            </a:r>
+          </a:p>
+        </p:txBody>
+      </p:sp>
+    </p:spTree>
+    <p:extLst>
+      <p:ext uri="{BB962C8B-B14F-4D97-AF65-F5344CB8AC3E}">
+        <p14:creationId xmlns:p14="http://schemas.microsoft.com/office/powerpoint/2010/main" val="1141978950"/>
+      </p:ext>
+    </p:extLst>
+  </p:cSld>
+  <p:clrMapOvr>
+    <a:masterClrMapping/>
+  </p:clrMapOvr>
+  <p:timing>
+    <p:tnLst>
+      <p:par>
+        <p:cTn id="1" dur="indefinite" restart="never" nodeType="tmRoot">
+          <p:childTnLst>
+            <p:seq concurrent="1" nextAc="seek">
+              <p:cTn id="2" dur="indefinite" nodeType="mainSeq">
+                <p:childTnLst>
+                  <p:par>
+                    <p:cTn id="3" fill="hold">
+                      <p:stCondLst>
+                        <p:cond delay="indefinite"/>
+                      </p:stCondLst>
+                      <p:childTnLst>
+                        <p:par>
+                          <p:cTn id="4" fill="hold">
+                            <p:stCondLst>
+                              <p:cond delay="0"/>
+                            </p:stCondLst>
+                            <p:childTnLst>
+                              <p:par>
+                                <p:cTn id="5" presetID="2" presetClass="entr" presetSubtype="8" fill="hold" grpId="0" nodeType="clickEffect" nodePh="1">
+                                  <p:stCondLst>
+                                    <p:cond delay="0"/>
+                                  </p:stCondLst>
+                                  <p:endCondLst>
+                                    <p:cond evt="begin" delay="0">
+                                      <p:tn val="5"/>
+                                    </p:cond>
+                                  </p:endCondLst>
+                                  <p:childTnLst>
+                                    <p:set>
+                                      <p:cBhvr>
+                                        <p:cTn id="6" dur="1" fill="hold">
+                                          <p:stCondLst>
+                                            <p:cond delay="0"/>
+                                          </p:stCondLst>
+                                        </p:cTn>
+                                        <p:tgtEl>
+                                          <p:spTgt spid="18">
+                                            <p:txEl>
+                                              <p:pRg st="0" end="0"/>
+                                            </p:txEl>
+                                          </p:spTgt>
+                                        </p:tgtEl>
+                                        <p:attrNameLst>
+                                          <p:attrName>style.visibility</p:attrName>
+                                        </p:attrNameLst>
+                                      </p:cBhvr>
+                                      <p:to>
+                                        <p:strVal val="visible"/>
+                                      </p:to>
+                                    </p:set>
+                                    <p:anim calcmode="lin" valueType="num">
+                                      <p:cBhvr additive="base">
+                                        <p:cTn id="7" dur="500" fill="hold"/>
+                                        <p:tgtEl>
+                                          <p:spTgt spid="18">
+                                            <p:txEl>
+                                              <p:pRg st="0" end="0"/>
+                                            </p:txEl>
+                                          </p:spTgt>
+                                        </p:tgtEl>
+                                        <p:attrNameLst>
+                                          <p:attrName>ppt_x</p:attrName>
+                                        </p:attrNameLst>
+                                      </p:cBhvr>
+                                      <p:tavLst>
+                                        <p:tav tm="0">
+                                          <p:val>
+                                            <p:strVal val="0-#ppt_w/2"/>
+                                          </p:val>
+                                        </p:tav>
+                                        <p:tav tm="100000">
+                                          <p:val>
+                                            <p:strVal val="#ppt_x"/>
+                                          </p:val>
+                                        </p:tav>
+                                      </p:tavLst>
+                                    </p:anim>
+                                    <p:anim calcmode="lin" valueType="num">
+                                      <p:cBhvr additive="base">
+                                        <p:cTn id="8" dur="500" fill="hold"/>
+                                        <p:tgtEl>
+                                          <p:spTgt spid="18">
+                                            <p:txEl>
+                                              <p:pRg st="0" end="0"/>
+                                            </p:txEl>
+                                          </p:spTgt>
+                                        </p:tgtEl>
+                                        <p:attrNameLst>
+                                          <p:attrName>ppt_y</p:attrName>
+                                        </p:attrNameLst>
+                                      </p:cBhvr>
+                                      <p:tavLst>
+                                        <p:tav tm="0">
+                                          <p:val>
+                                            <p:strVal val="#ppt_y"/>
+                                          </p:val>
+                                        </p:tav>
+                                        <p:tav tm="100000">
+                                          <p:val>
+                                            <p:strVal val="#ppt_y"/>
+                                          </p:val>
+                                        </p:tav>
+                                      </p:tavLst>
+                                    </p:anim>
+                                  </p:childTnLst>
+                                </p:cTn>
+                              </p:par>
+                            </p:childTnLst>
+                          </p:cTn>
+                        </p:par>
+                      </p:childTnLst>
+                    </p:cTn>
+                  </p:par>
+                </p:childTnLst>
+              </p:cTn>
+              <p:prevCondLst>
+                <p:cond evt="onPrev" delay="0">
+                  <p:tgtEl>
+                    <p:sldTgt/>
+                  </p:tgtEl>
+                </p:cond>
+              </p:prevCondLst>
+              <p:nextCondLst>
+                <p:cond evt="onNext" delay="0">
+                  <p:tgtEl>
+                    <p:sldTgt/>
+                  </p:tgtEl>
+                </p:cond>
+              </p:nextCondLst>
+            </p:seq>
+          </p:childTnLst>
+        </p:cTn>
+      </p:par>
+    </p:tnLst>
+    <p:bldLst>
+      <p:bldP spid="18" grpId="0" build="p" autoUpdateAnimBg="0"/>
+    </p:bldLst>
+  </p:timing>
+</p:sld>
+</file>
+
+<file path=ppt/slides/slide14.xml><?xml version="1.0" encoding="utf-8"?>
+<p:sld xmlns:a="http://schemas.openxmlformats.org/drawingml/2006/main" xmlns:r="http://schemas.openxmlformats.org/officeDocument/2006/relationships" xmlns:p="http://schemas.openxmlformats.org/presentationml/2006/main">
+  <p:cSld>
+    <p:spTree>
+      <p:nvGrpSpPr>
+        <p:cNvPr id="1" name=""/>
+        <p:cNvGrpSpPr/>
+        <p:nvPr/>
+      </p:nvGrpSpPr>
+      <p:grpSpPr>
+        <a:xfrm>
+          <a:off x="0" y="0"/>
+          <a:ext cx="0" cy="0"/>
+          <a:chOff x="0" y="0"/>
+          <a:chExt cx="0" cy="0"/>
+        </a:xfrm>
+      </p:grpSpPr>
+      <p:sp>
+        <p:nvSpPr>
+          <p:cNvPr id="18" name="Rectangle 3"/>
+          <p:cNvSpPr txBox="1">
+            <a:spLocks noChangeArrowheads="1"/>
+          </p:cNvSpPr>
+          <p:nvPr/>
+        </p:nvSpPr>
+        <p:spPr>
+          <a:xfrm>
+            <a:off x="1543050" y="3371850"/>
+            <a:ext cx="6286500" cy="342900"/>
+          </a:xfrm>
+          <a:prstGeom prst="rect">
+            <a:avLst/>
+          </a:prstGeom>
+        </p:spPr>
+        <p:txBody>
+          <a:bodyPr/>
+          <a:lstStyle/>
+          <a:p>
+            <a:pPr algn="ctr" eaLnBrk="0" fontAlgn="base" hangingPunct="0">
+              <a:spcBef>
+                <a:spcPct val="20000"/>
+              </a:spcBef>
+              <a:spcAft>
+                <a:spcPct val="20000"/>
+              </a:spcAft>
+              <a:defRPr/>
+            </a:pPr>
+            <a:endParaRPr lang="en-US" sz="3600" dirty="0">
+              <a:sym typeface="Symbol" pitchFamily="18" charset="2"/>
+            </a:endParaRPr>
+          </a:p>
+        </p:txBody>
+      </p:sp>
+      <p:sp>
+        <p:nvSpPr>
+          <p:cNvPr id="3" name="Title 2">
+            <a:extLst>
+              <a:ext uri="{FF2B5EF4-FFF2-40B4-BE49-F238E27FC236}">
+                <a16:creationId xmlns:a16="http://schemas.microsoft.com/office/drawing/2014/main" id="{7CBEB6BF-435C-4050-8916-C2A3F4028ED5}"/>
+              </a:ext>
+            </a:extLst>
+          </p:cNvPr>
+          <p:cNvSpPr>
+            <a:spLocks noGrp="1"/>
+          </p:cNvSpPr>
+          <p:nvPr>
+            <p:ph type="title"/>
+          </p:nvPr>
+        </p:nvSpPr>
+        <p:spPr/>
+        <p:txBody>
+          <a:bodyPr>
+            <a:normAutofit/>
+          </a:bodyPr>
+          <a:lstStyle/>
+          <a:p>
+            <a:r>
+              <a:rPr lang="en-IN" sz="2800" dirty="0">
+                <a:latin typeface="Verdana" panose="020B0604030504040204" pitchFamily="34" charset="0"/>
+                <a:ea typeface="Verdana" panose="020B0604030504040204" pitchFamily="34" charset="0"/>
+              </a:rPr>
+              <a:t>Description</a:t>
+            </a:r>
+          </a:p>
+        </p:txBody>
+      </p:sp>
+      <p:sp>
+        <p:nvSpPr>
+          <p:cNvPr id="6" name="Slide Number Placeholder 3">
+            <a:extLst>
+              <a:ext uri="{FF2B5EF4-FFF2-40B4-BE49-F238E27FC236}">
+                <a16:creationId xmlns:a16="http://schemas.microsoft.com/office/drawing/2014/main" id="{8582021D-08E8-4879-942F-0C8B29BE02D7}"/>
+              </a:ext>
+            </a:extLst>
+          </p:cNvPr>
+          <p:cNvSpPr>
+            <a:spLocks noGrp="1"/>
+          </p:cNvSpPr>
+          <p:nvPr>
+            <p:ph type="sldNum" sz="quarter" idx="12"/>
+          </p:nvPr>
+        </p:nvSpPr>
+        <p:spPr>
+          <a:xfrm>
+            <a:off x="7391400" y="6477000"/>
+            <a:ext cx="1600200" cy="195263"/>
+          </a:xfrm>
+        </p:spPr>
+        <p:txBody>
+          <a:bodyPr/>
+          <a:lstStyle/>
+          <a:p>
+            <a:pPr>
+              <a:defRPr/>
+            </a:pPr>
+            <a:fld id="{02246FD1-0723-4B2F-9706-10282F2BA698}" type="slidenum">
+              <a:rPr lang="en-US" smtClean="0">
+                <a:latin typeface="Verdana" panose="020B0604030504040204" pitchFamily="34" charset="0"/>
+                <a:ea typeface="Verdana" panose="020B0604030504040204" pitchFamily="34" charset="0"/>
+              </a:rPr>
+              <a:pPr>
+                <a:defRPr/>
+              </a:pPr>
+              <a:t>14</a:t>
+            </a:fld>
+            <a:r>
+              <a:rPr lang="en-US" dirty="0">
+                <a:latin typeface="Verdana" panose="020B0604030504040204" pitchFamily="34" charset="0"/>
+                <a:ea typeface="Verdana" panose="020B0604030504040204" pitchFamily="34" charset="0"/>
+              </a:rPr>
+              <a:t> </a:t>
+            </a:r>
+          </a:p>
+        </p:txBody>
+      </p:sp>
+      <p:sp>
+        <p:nvSpPr>
+          <p:cNvPr id="2" name="TextBox 1">
+            <a:extLst>
+              <a:ext uri="{FF2B5EF4-FFF2-40B4-BE49-F238E27FC236}">
+                <a16:creationId xmlns:a16="http://schemas.microsoft.com/office/drawing/2014/main" id="{89E9753A-F953-4C83-AAA5-E8BB4D499112}"/>
+              </a:ext>
+            </a:extLst>
+          </p:cNvPr>
+          <p:cNvSpPr txBox="1"/>
+          <p:nvPr/>
+        </p:nvSpPr>
+        <p:spPr>
+          <a:xfrm>
+            <a:off x="1901043" y="1012529"/>
+            <a:ext cx="5570513" cy="461665"/>
+          </a:xfrm>
+          <a:prstGeom prst="rect">
+            <a:avLst/>
+          </a:prstGeom>
+          <a:noFill/>
+        </p:spPr>
+        <p:txBody>
+          <a:bodyPr wrap="square" rtlCol="0">
+            <a:spAutoFit/>
+          </a:bodyPr>
+          <a:lstStyle/>
+          <a:p>
+            <a:r>
+              <a:rPr lang="en-US" sz="2400" b="1" dirty="0">
+                <a:latin typeface="Bahnschrift" panose="020B0502040204020203" pitchFamily="34" charset="0"/>
+              </a:rPr>
+              <a:t>CROP RECOMMENDATION SYSTEM</a:t>
+            </a:r>
+          </a:p>
+        </p:txBody>
+      </p:sp>
+    </p:spTree>
+    <p:extLst>
+      <p:ext uri="{BB962C8B-B14F-4D97-AF65-F5344CB8AC3E}">
+        <p14:creationId xmlns:p14="http://schemas.microsoft.com/office/powerpoint/2010/main" val="1128237630"/>
+      </p:ext>
+    </p:extLst>
+  </p:cSld>
+  <p:clrMapOvr>
+    <a:masterClrMapping/>
+  </p:clrMapOvr>
+  <p:timing>
+    <p:tnLst>
+      <p:par>
+        <p:cTn id="1" dur="indefinite" restart="never" nodeType="tmRoot">
+          <p:childTnLst>
+            <p:seq concurrent="1" nextAc="seek">
+              <p:cTn id="2" dur="indefinite" nodeType="mainSeq">
+                <p:childTnLst>
+                  <p:par>
+                    <p:cTn id="3" fill="hold">
+                      <p:stCondLst>
+                        <p:cond delay="indefinite"/>
+                      </p:stCondLst>
+                      <p:childTnLst>
+                        <p:par>
+                          <p:cTn id="4" fill="hold">
+                            <p:stCondLst>
+                              <p:cond delay="0"/>
+                            </p:stCondLst>
+                            <p:childTnLst>
+                              <p:par>
+                                <p:cTn id="5" presetID="2" presetClass="entr" presetSubtype="8" fill="hold" grpId="0" nodeType="clickEffect" nodePh="1">
+                                  <p:stCondLst>
+                                    <p:cond delay="0"/>
+                                  </p:stCondLst>
+                                  <p:endCondLst>
+                                    <p:cond evt="begin" delay="0">
+                                      <p:tn val="5"/>
+                                    </p:cond>
+                                  </p:endCondLst>
+                                  <p:childTnLst>
+                                    <p:set>
+                                      <p:cBhvr>
+                                        <p:cTn id="6" dur="1" fill="hold">
+                                          <p:stCondLst>
+                                            <p:cond delay="0"/>
+                                          </p:stCondLst>
+                                        </p:cTn>
+                                        <p:tgtEl>
+                                          <p:spTgt spid="18">
+                                            <p:txEl>
+                                              <p:pRg st="0" end="0"/>
+                                            </p:txEl>
+                                          </p:spTgt>
+                                        </p:tgtEl>
+                                        <p:attrNameLst>
+                                          <p:attrName>style.visibility</p:attrName>
+                                        </p:attrNameLst>
+                                      </p:cBhvr>
+                                      <p:to>
+                                        <p:strVal val="visible"/>
+                                      </p:to>
+                                    </p:set>
+                                    <p:anim calcmode="lin" valueType="num">
+                                      <p:cBhvr additive="base">
+                                        <p:cTn id="7" dur="500" fill="hold"/>
+                                        <p:tgtEl>
+                                          <p:spTgt spid="18">
+                                            <p:txEl>
+                                              <p:pRg st="0" end="0"/>
+                                            </p:txEl>
+                                          </p:spTgt>
+                                        </p:tgtEl>
+                                        <p:attrNameLst>
+                                          <p:attrName>ppt_x</p:attrName>
+                                        </p:attrNameLst>
+                                      </p:cBhvr>
+                                      <p:tavLst>
+                                        <p:tav tm="0">
+                                          <p:val>
+                                            <p:strVal val="0-#ppt_w/2"/>
+                                          </p:val>
+                                        </p:tav>
+                                        <p:tav tm="100000">
+                                          <p:val>
+                                            <p:strVal val="#ppt_x"/>
+                                          </p:val>
+                                        </p:tav>
+                                      </p:tavLst>
+                                    </p:anim>
+                                    <p:anim calcmode="lin" valueType="num">
+                                      <p:cBhvr additive="base">
+                                        <p:cTn id="8" dur="500" fill="hold"/>
+                                        <p:tgtEl>
+                                          <p:spTgt spid="18">
+                                            <p:txEl>
+                                              <p:pRg st="0" end="0"/>
+                                            </p:txEl>
+                                          </p:spTgt>
+                                        </p:tgtEl>
+                                        <p:attrNameLst>
+                                          <p:attrName>ppt_y</p:attrName>
+                                        </p:attrNameLst>
+                                      </p:cBhvr>
+                                      <p:tavLst>
+                                        <p:tav tm="0">
+                                          <p:val>
+                                            <p:strVal val="#ppt_y"/>
+                                          </p:val>
+                                        </p:tav>
+                                        <p:tav tm="100000">
+                                          <p:val>
+                                            <p:strVal val="#ppt_y"/>
+                                          </p:val>
+                                        </p:tav>
+                                      </p:tavLst>
+                                    </p:anim>
+                                  </p:childTnLst>
+                                </p:cTn>
+                              </p:par>
+                            </p:childTnLst>
+                          </p:cTn>
+                        </p:par>
+                      </p:childTnLst>
+                    </p:cTn>
+                  </p:par>
+                </p:childTnLst>
+              </p:cTn>
+              <p:prevCondLst>
+                <p:cond evt="onPrev" delay="0">
+                  <p:tgtEl>
+                    <p:sldTgt/>
+                  </p:tgtEl>
+                </p:cond>
+              </p:prevCondLst>
+              <p:nextCondLst>
+                <p:cond evt="onNext" delay="0">
+                  <p:tgtEl>
+                    <p:sldTgt/>
+                  </p:tgtEl>
+                </p:cond>
+              </p:nextCondLst>
+            </p:seq>
+          </p:childTnLst>
+        </p:cTn>
+      </p:par>
+    </p:tnLst>
+    <p:bldLst>
+      <p:bldP spid="18" grpId="0" build="p" autoUpdateAnimBg="0"/>
+    </p:bldLst>
+  </p:timing>
+</p:sld>
+</file>
+
+<file path=ppt/slides/slide15.xml><?xml version="1.0" encoding="utf-8"?>
+<p:sld xmlns:a="http://schemas.openxmlformats.org/drawingml/2006/main" xmlns:r="http://schemas.openxmlformats.org/officeDocument/2006/relationships" xmlns:p="http://schemas.openxmlformats.org/presentationml/2006/main">
+  <p:cSld>
+    <p:spTree>
+      <p:nvGrpSpPr>
+        <p:cNvPr id="1" name=""/>
+        <p:cNvGrpSpPr/>
+        <p:nvPr/>
+      </p:nvGrpSpPr>
+      <p:grpSpPr>
+        <a:xfrm>
+          <a:off x="0" y="0"/>
+          <a:ext cx="0" cy="0"/>
+          <a:chOff x="0" y="0"/>
+          <a:chExt cx="0" cy="0"/>
+        </a:xfrm>
+      </p:grpSpPr>
+      <p:sp>
+        <p:nvSpPr>
+          <p:cNvPr id="18" name="Rectangle 3"/>
+          <p:cNvSpPr txBox="1">
+            <a:spLocks noChangeArrowheads="1"/>
+          </p:cNvSpPr>
+          <p:nvPr/>
+        </p:nvSpPr>
+        <p:spPr>
+          <a:xfrm>
+            <a:off x="1543050" y="3371850"/>
+            <a:ext cx="6286500" cy="342900"/>
+          </a:xfrm>
+          <a:prstGeom prst="rect">
+            <a:avLst/>
+          </a:prstGeom>
+        </p:spPr>
+        <p:txBody>
+          <a:bodyPr/>
+          <a:lstStyle/>
+          <a:p>
+            <a:pPr algn="ctr" eaLnBrk="0" fontAlgn="base" hangingPunct="0">
+              <a:spcBef>
+                <a:spcPct val="20000"/>
+              </a:spcBef>
+              <a:spcAft>
+                <a:spcPct val="20000"/>
+              </a:spcAft>
+              <a:defRPr/>
+            </a:pPr>
+            <a:endParaRPr lang="en-US" sz="3600" dirty="0">
+              <a:sym typeface="Symbol" pitchFamily="18" charset="2"/>
+            </a:endParaRPr>
+          </a:p>
+        </p:txBody>
+      </p:sp>
+      <p:sp>
+        <p:nvSpPr>
+          <p:cNvPr id="3" name="Title 2">
+            <a:extLst>
+              <a:ext uri="{FF2B5EF4-FFF2-40B4-BE49-F238E27FC236}">
+                <a16:creationId xmlns:a16="http://schemas.microsoft.com/office/drawing/2014/main" id="{7CBEB6BF-435C-4050-8916-C2A3F4028ED5}"/>
+              </a:ext>
+            </a:extLst>
+          </p:cNvPr>
+          <p:cNvSpPr>
+            <a:spLocks noGrp="1"/>
+          </p:cNvSpPr>
+          <p:nvPr>
+            <p:ph type="title"/>
+          </p:nvPr>
+        </p:nvSpPr>
+        <p:spPr/>
+        <p:txBody>
+          <a:bodyPr>
+            <a:normAutofit/>
+          </a:bodyPr>
+          <a:lstStyle/>
+          <a:p>
+            <a:r>
+              <a:rPr lang="en-IN" sz="2800" dirty="0">
+                <a:latin typeface="Verdana" panose="020B0604030504040204" pitchFamily="34" charset="0"/>
+                <a:ea typeface="Verdana" panose="020B0604030504040204" pitchFamily="34" charset="0"/>
+              </a:rPr>
+              <a:t>Description</a:t>
+            </a:r>
+          </a:p>
+        </p:txBody>
+      </p:sp>
+      <p:sp>
+        <p:nvSpPr>
+          <p:cNvPr id="6" name="Slide Number Placeholder 3">
+            <a:extLst>
+              <a:ext uri="{FF2B5EF4-FFF2-40B4-BE49-F238E27FC236}">
+                <a16:creationId xmlns:a16="http://schemas.microsoft.com/office/drawing/2014/main" id="{8582021D-08E8-4879-942F-0C8B29BE02D7}"/>
+              </a:ext>
+            </a:extLst>
+          </p:cNvPr>
+          <p:cNvSpPr>
+            <a:spLocks noGrp="1"/>
+          </p:cNvSpPr>
+          <p:nvPr>
+            <p:ph type="sldNum" sz="quarter" idx="12"/>
+          </p:nvPr>
+        </p:nvSpPr>
+        <p:spPr>
+          <a:xfrm>
+            <a:off x="7391400" y="6477000"/>
+            <a:ext cx="1600200" cy="195263"/>
+          </a:xfrm>
+        </p:spPr>
+        <p:txBody>
+          <a:bodyPr/>
+          <a:lstStyle/>
+          <a:p>
+            <a:pPr>
+              <a:defRPr/>
+            </a:pPr>
+            <a:fld id="{02246FD1-0723-4B2F-9706-10282F2BA698}" type="slidenum">
+              <a:rPr lang="en-US" smtClean="0">
+                <a:latin typeface="Verdana" panose="020B0604030504040204" pitchFamily="34" charset="0"/>
+                <a:ea typeface="Verdana" panose="020B0604030504040204" pitchFamily="34" charset="0"/>
+              </a:rPr>
+              <a:pPr>
+                <a:defRPr/>
+              </a:pPr>
+              <a:t>15</a:t>
+            </a:fld>
+            <a:r>
+              <a:rPr lang="en-US" dirty="0">
+                <a:latin typeface="Verdana" panose="020B0604030504040204" pitchFamily="34" charset="0"/>
+                <a:ea typeface="Verdana" panose="020B0604030504040204" pitchFamily="34" charset="0"/>
+              </a:rPr>
+              <a:t> </a:t>
+            </a:r>
+          </a:p>
+        </p:txBody>
+      </p:sp>
+      <p:sp>
+        <p:nvSpPr>
+          <p:cNvPr id="2" name="TextBox 1">
+            <a:extLst>
+              <a:ext uri="{FF2B5EF4-FFF2-40B4-BE49-F238E27FC236}">
+                <a16:creationId xmlns:a16="http://schemas.microsoft.com/office/drawing/2014/main" id="{89E9753A-F953-4C83-AAA5-E8BB4D499112}"/>
+              </a:ext>
+            </a:extLst>
+          </p:cNvPr>
+          <p:cNvSpPr txBox="1"/>
+          <p:nvPr/>
+        </p:nvSpPr>
+        <p:spPr>
+          <a:xfrm>
+            <a:off x="1598221" y="1143000"/>
+            <a:ext cx="6176157" cy="461665"/>
+          </a:xfrm>
+          <a:prstGeom prst="rect">
+            <a:avLst/>
+          </a:prstGeom>
+          <a:noFill/>
+        </p:spPr>
+        <p:txBody>
+          <a:bodyPr wrap="square" rtlCol="0">
+            <a:spAutoFit/>
+          </a:bodyPr>
+          <a:lstStyle/>
+          <a:p>
+            <a:r>
+              <a:rPr lang="en-US" sz="2400" b="1" dirty="0">
+                <a:latin typeface="Bahnschrift" panose="020B0502040204020203" pitchFamily="34" charset="0"/>
+              </a:rPr>
+              <a:t>FERTILIZER RECOMMENDATION SYSTEM</a:t>
+            </a:r>
+          </a:p>
+        </p:txBody>
+      </p:sp>
+      <p:sp>
+        <p:nvSpPr>
+          <p:cNvPr id="7" name="TextBox 6">
+            <a:extLst>
+              <a:ext uri="{FF2B5EF4-FFF2-40B4-BE49-F238E27FC236}">
+                <a16:creationId xmlns:a16="http://schemas.microsoft.com/office/drawing/2014/main" id="{6194FBAC-C18A-4BB2-B70C-7ED0F5AEB449}"/>
+              </a:ext>
+            </a:extLst>
+          </p:cNvPr>
+          <p:cNvSpPr txBox="1"/>
+          <p:nvPr/>
+        </p:nvSpPr>
+        <p:spPr>
+          <a:xfrm>
+            <a:off x="1076324" y="1981200"/>
+            <a:ext cx="6991350" cy="3831818"/>
+          </a:xfrm>
+          <a:prstGeom prst="rect">
+            <a:avLst/>
+          </a:prstGeom>
+          <a:noFill/>
+        </p:spPr>
+        <p:txBody>
+          <a:bodyPr wrap="square" rtlCol="0">
+            <a:spAutoFit/>
+          </a:bodyPr>
+          <a:lstStyle/>
+          <a:p>
+            <a:r>
+              <a:rPr lang="en-US" sz="2300" b="1" dirty="0">
+                <a:latin typeface="Verdana" panose="020B0604030504040204" pitchFamily="34" charset="0"/>
+                <a:ea typeface="Verdana" panose="020B0604030504040204" pitchFamily="34" charset="0"/>
+              </a:rPr>
+              <a:t>Goal : </a:t>
+            </a:r>
+          </a:p>
+          <a:p>
+            <a:endParaRPr lang="en-US" sz="2200" b="1" dirty="0">
+              <a:latin typeface="Verdana" panose="020B0604030504040204" pitchFamily="34" charset="0"/>
+              <a:ea typeface="Verdana" panose="020B0604030504040204" pitchFamily="34" charset="0"/>
+            </a:endParaRPr>
+          </a:p>
+          <a:p>
+            <a:r>
+              <a:rPr lang="en-US" sz="2200" dirty="0">
+                <a:latin typeface="Verdana" panose="020B0604030504040204" pitchFamily="34" charset="0"/>
+                <a:ea typeface="Verdana" panose="020B0604030504040204" pitchFamily="34" charset="0"/>
+              </a:rPr>
+              <a:t>To suggest farmers about the do’s and don'ts of fertilizing the crops and help them to take informed decision about their farming strategy</a:t>
+            </a:r>
+          </a:p>
+          <a:p>
+            <a:endParaRPr lang="en-US" sz="2200" dirty="0">
+              <a:latin typeface="Verdana" panose="020B0604030504040204" pitchFamily="34" charset="0"/>
+              <a:ea typeface="Verdana" panose="020B0604030504040204" pitchFamily="34" charset="0"/>
+            </a:endParaRPr>
+          </a:p>
+          <a:p>
+            <a:r>
+              <a:rPr lang="en-US" sz="2200" dirty="0">
+                <a:latin typeface="Verdana" panose="020B0604030504040204" pitchFamily="34" charset="0"/>
+                <a:ea typeface="Verdana" panose="020B0604030504040204" pitchFamily="34" charset="0"/>
+              </a:rPr>
+              <a:t>Parameters used to suggest the fertilizing strategy are Nitrogen, Phosphorous </a:t>
+            </a:r>
+            <a:r>
+              <a:rPr lang="en-US" sz="2200">
+                <a:latin typeface="Verdana" panose="020B0604030504040204" pitchFamily="34" charset="0"/>
+                <a:ea typeface="Verdana" panose="020B0604030504040204" pitchFamily="34" charset="0"/>
+              </a:rPr>
+              <a:t>and Potassium</a:t>
+            </a:r>
+            <a:endParaRPr lang="en-US" sz="2200" dirty="0">
+              <a:latin typeface="Verdana" panose="020B0604030504040204" pitchFamily="34" charset="0"/>
+              <a:ea typeface="Verdana" panose="020B0604030504040204" pitchFamily="34" charset="0"/>
+            </a:endParaRPr>
+          </a:p>
+          <a:p>
+            <a:endParaRPr lang="en-US" sz="2200" dirty="0">
+              <a:latin typeface="Verdana" panose="020B0604030504040204" pitchFamily="34" charset="0"/>
+              <a:ea typeface="Verdana" panose="020B0604030504040204" pitchFamily="34" charset="0"/>
+            </a:endParaRPr>
+          </a:p>
+          <a:p>
+            <a:endParaRPr lang="en-US" sz="2200" dirty="0">
+              <a:latin typeface="Verdana" panose="020B0604030504040204" pitchFamily="34" charset="0"/>
+              <a:ea typeface="Verdana" panose="020B0604030504040204" pitchFamily="34" charset="0"/>
+            </a:endParaRPr>
+          </a:p>
+        </p:txBody>
+      </p:sp>
+    </p:spTree>
+    <p:extLst>
+      <p:ext uri="{BB962C8B-B14F-4D97-AF65-F5344CB8AC3E}">
+        <p14:creationId xmlns:p14="http://schemas.microsoft.com/office/powerpoint/2010/main" val="805629861"/>
+      </p:ext>
+    </p:extLst>
+  </p:cSld>
+  <p:clrMapOvr>
+    <a:masterClrMapping/>
+  </p:clrMapOvr>
+  <p:timing>
+    <p:tnLst>
+      <p:par>
+        <p:cTn id="1" dur="indefinite" restart="never" nodeType="tmRoot">
+          <p:childTnLst>
+            <p:seq concurrent="1" nextAc="seek">
+              <p:cTn id="2" dur="indefinite" nodeType="mainSeq">
+                <p:childTnLst>
+                  <p:par>
+                    <p:cTn id="3" fill="hold">
+                      <p:stCondLst>
+                        <p:cond delay="indefinite"/>
+                      </p:stCondLst>
+                      <p:childTnLst>
+                        <p:par>
+                          <p:cTn id="4" fill="hold">
+                            <p:stCondLst>
+                              <p:cond delay="0"/>
+                            </p:stCondLst>
+                            <p:childTnLst>
+                              <p:par>
+                                <p:cTn id="5" presetID="2" presetClass="entr" presetSubtype="8" fill="hold" grpId="0" nodeType="clickEffect" nodePh="1">
+                                  <p:stCondLst>
+                                    <p:cond delay="0"/>
+                                  </p:stCondLst>
+                                  <p:endCondLst>
+                                    <p:cond evt="begin" delay="0">
+                                      <p:tn val="5"/>
+                                    </p:cond>
+                                  </p:endCondLst>
+                                  <p:childTnLst>
+                                    <p:set>
+                                      <p:cBhvr>
+                                        <p:cTn id="6" dur="1" fill="hold">
+                                          <p:stCondLst>
+                                            <p:cond delay="0"/>
+                                          </p:stCondLst>
+                                        </p:cTn>
+                                        <p:tgtEl>
+                                          <p:spTgt spid="18">
+                                            <p:txEl>
+                                              <p:pRg st="0" end="0"/>
+                                            </p:txEl>
+                                          </p:spTgt>
+                                        </p:tgtEl>
+                                        <p:attrNameLst>
+                                          <p:attrName>style.visibility</p:attrName>
+                                        </p:attrNameLst>
+                                      </p:cBhvr>
+                                      <p:to>
+                                        <p:strVal val="visible"/>
+                                      </p:to>
+                                    </p:set>
+                                    <p:anim calcmode="lin" valueType="num">
+                                      <p:cBhvr additive="base">
+                                        <p:cTn id="7" dur="500" fill="hold"/>
+                                        <p:tgtEl>
+                                          <p:spTgt spid="18">
+                                            <p:txEl>
+                                              <p:pRg st="0" end="0"/>
+                                            </p:txEl>
+                                          </p:spTgt>
+                                        </p:tgtEl>
+                                        <p:attrNameLst>
+                                          <p:attrName>ppt_x</p:attrName>
+                                        </p:attrNameLst>
+                                      </p:cBhvr>
+                                      <p:tavLst>
+                                        <p:tav tm="0">
+                                          <p:val>
+                                            <p:strVal val="0-#ppt_w/2"/>
+                                          </p:val>
+                                        </p:tav>
+                                        <p:tav tm="100000">
+                                          <p:val>
+                                            <p:strVal val="#ppt_x"/>
+                                          </p:val>
+                                        </p:tav>
+                                      </p:tavLst>
+                                    </p:anim>
+                                    <p:anim calcmode="lin" valueType="num">
+                                      <p:cBhvr additive="base">
+                                        <p:cTn id="8" dur="500" fill="hold"/>
+                                        <p:tgtEl>
+                                          <p:spTgt spid="18">
+                                            <p:txEl>
+                                              <p:pRg st="0" end="0"/>
+                                            </p:txEl>
+                                          </p:spTgt>
+                                        </p:tgtEl>
+                                        <p:attrNameLst>
+                                          <p:attrName>ppt_y</p:attrName>
+                                        </p:attrNameLst>
+                                      </p:cBhvr>
+                                      <p:tavLst>
+                                        <p:tav tm="0">
+                                          <p:val>
+                                            <p:strVal val="#ppt_y"/>
+                                          </p:val>
+                                        </p:tav>
+                                        <p:tav tm="100000">
+                                          <p:val>
+                                            <p:strVal val="#ppt_y"/>
+                                          </p:val>
+                                        </p:tav>
+                                      </p:tavLst>
+                                    </p:anim>
+                                  </p:childTnLst>
+                                </p:cTn>
+                              </p:par>
+                            </p:childTnLst>
+                          </p:cTn>
+                        </p:par>
+                      </p:childTnLst>
+                    </p:cTn>
+                  </p:par>
+                </p:childTnLst>
+              </p:cTn>
+              <p:prevCondLst>
+                <p:cond evt="onPrev" delay="0">
+                  <p:tgtEl>
+                    <p:sldTgt/>
+                  </p:tgtEl>
+                </p:cond>
+              </p:prevCondLst>
+              <p:nextCondLst>
+                <p:cond evt="onNext" delay="0">
+                  <p:tgtEl>
+                    <p:sldTgt/>
+                  </p:tgtEl>
+                </p:cond>
+              </p:nextCondLst>
+            </p:seq>
+          </p:childTnLst>
+        </p:cTn>
+      </p:par>
+    </p:tnLst>
+    <p:bldLst>
+      <p:bldP spid="18" grpId="0" build="p" autoUpdateAnimBg="0"/>
+    </p:bldLst>
+  </p:timing>
+</p:sld>
+</file>
+
+<file path=ppt/slides/slide16.xml><?xml version="1.0" encoding="utf-8"?>
+<p:sld xmlns:a="http://schemas.openxmlformats.org/drawingml/2006/main" xmlns:r="http://schemas.openxmlformats.org/officeDocument/2006/relationships" xmlns:p="http://schemas.openxmlformats.org/presentationml/2006/main">
+  <p:cSld>
+    <p:spTree>
+      <p:nvGrpSpPr>
+        <p:cNvPr id="1" name=""/>
+        <p:cNvGrpSpPr/>
+        <p:nvPr/>
+      </p:nvGrpSpPr>
+      <p:grpSpPr>
+        <a:xfrm>
+          <a:off x="0" y="0"/>
+          <a:ext cx="0" cy="0"/>
+          <a:chOff x="0" y="0"/>
+          <a:chExt cx="0" cy="0"/>
+        </a:xfrm>
+      </p:grpSpPr>
+      <p:sp>
+        <p:nvSpPr>
+          <p:cNvPr id="18" name="Rectangle 3"/>
+          <p:cNvSpPr txBox="1">
+            <a:spLocks noChangeArrowheads="1"/>
+          </p:cNvSpPr>
+          <p:nvPr/>
+        </p:nvSpPr>
+        <p:spPr>
+          <a:xfrm>
+            <a:off x="1543050" y="3371850"/>
+            <a:ext cx="6286500" cy="342900"/>
+          </a:xfrm>
+          <a:prstGeom prst="rect">
+            <a:avLst/>
+          </a:prstGeom>
+        </p:spPr>
+        <p:txBody>
+          <a:bodyPr/>
+          <a:lstStyle/>
+          <a:p>
+            <a:pPr algn="ctr" eaLnBrk="0" fontAlgn="base" hangingPunct="0">
+              <a:spcBef>
+                <a:spcPct val="20000"/>
+              </a:spcBef>
+              <a:spcAft>
+                <a:spcPct val="20000"/>
+              </a:spcAft>
+              <a:defRPr/>
+            </a:pPr>
+            <a:endParaRPr lang="en-US" sz="3600" dirty="0">
+              <a:sym typeface="Symbol" pitchFamily="18" charset="2"/>
+            </a:endParaRPr>
+          </a:p>
+        </p:txBody>
+      </p:sp>
+      <p:sp>
+        <p:nvSpPr>
+          <p:cNvPr id="3" name="Title 2">
+            <a:extLst>
+              <a:ext uri="{FF2B5EF4-FFF2-40B4-BE49-F238E27FC236}">
+                <a16:creationId xmlns:a16="http://schemas.microsoft.com/office/drawing/2014/main" id="{7CBEB6BF-435C-4050-8916-C2A3F4028ED5}"/>
+              </a:ext>
+            </a:extLst>
+          </p:cNvPr>
+          <p:cNvSpPr>
+            <a:spLocks noGrp="1"/>
+          </p:cNvSpPr>
+          <p:nvPr>
+            <p:ph type="title"/>
+          </p:nvPr>
+        </p:nvSpPr>
+        <p:spPr/>
+        <p:txBody>
+          <a:bodyPr>
+            <a:normAutofit/>
+          </a:bodyPr>
+          <a:lstStyle/>
+          <a:p>
+            <a:r>
+              <a:rPr lang="en-IN" sz="2800" dirty="0">
+                <a:latin typeface="Verdana" panose="020B0604030504040204" pitchFamily="34" charset="0"/>
+                <a:ea typeface="Verdana" panose="020B0604030504040204" pitchFamily="34" charset="0"/>
+              </a:rPr>
+              <a:t>Description</a:t>
+            </a:r>
+          </a:p>
+        </p:txBody>
+      </p:sp>
+      <p:sp>
+        <p:nvSpPr>
+          <p:cNvPr id="7" name="TextBox 6">
+            <a:extLst>
+              <a:ext uri="{FF2B5EF4-FFF2-40B4-BE49-F238E27FC236}">
+                <a16:creationId xmlns:a16="http://schemas.microsoft.com/office/drawing/2014/main" id="{CE674E32-7A29-496C-AAED-9D3511E24D63}"/>
+              </a:ext>
+            </a:extLst>
+          </p:cNvPr>
+          <p:cNvSpPr txBox="1"/>
+          <p:nvPr/>
+        </p:nvSpPr>
+        <p:spPr>
+          <a:xfrm>
+            <a:off x="838200" y="1447800"/>
+            <a:ext cx="8305800" cy="3664786"/>
+          </a:xfrm>
+          <a:prstGeom prst="rect">
+            <a:avLst/>
+          </a:prstGeom>
+          <a:noFill/>
+        </p:spPr>
+        <p:txBody>
+          <a:bodyPr wrap="square" rtlCol="0">
+            <a:spAutoFit/>
+          </a:bodyPr>
+          <a:lstStyle/>
+          <a:p>
+            <a:pPr marL="342900" indent="-342900">
+              <a:lnSpc>
+                <a:spcPct val="200000"/>
+              </a:lnSpc>
+              <a:buFont typeface="Arial" panose="020B0604020202020204" pitchFamily="34" charset="0"/>
+              <a:buChar char="•"/>
+            </a:pPr>
+            <a:r>
+              <a:rPr lang="en-IN" sz="2400" dirty="0">
+                <a:solidFill>
+                  <a:srgbClr val="002060"/>
+                </a:solidFill>
+                <a:latin typeface="Verdana" panose="020B0604030504040204" pitchFamily="34" charset="0"/>
+                <a:ea typeface="Verdana" panose="020B0604030504040204" pitchFamily="34" charset="0"/>
+              </a:rPr>
+              <a:t>Plant disease prediction using images of diseased plant leaves</a:t>
+            </a:r>
+          </a:p>
+          <a:p>
+            <a:pPr marL="342900" indent="-342900">
+              <a:lnSpc>
+                <a:spcPct val="200000"/>
+              </a:lnSpc>
+              <a:buFont typeface="Arial" panose="020B0604020202020204" pitchFamily="34" charset="0"/>
+              <a:buChar char="•"/>
+            </a:pPr>
+            <a:r>
+              <a:rPr lang="en-IN" sz="2400" dirty="0">
+                <a:solidFill>
+                  <a:srgbClr val="002060"/>
+                </a:solidFill>
+                <a:latin typeface="Verdana" panose="020B0604030504040204" pitchFamily="34" charset="0"/>
+                <a:ea typeface="Verdana" panose="020B0604030504040204" pitchFamily="34" charset="0"/>
+              </a:rPr>
+              <a:t>Augmented data of 15 plants having 88,000 rgb images and 38 classes</a:t>
+            </a:r>
+          </a:p>
+          <a:p>
+            <a:pPr marL="342900" indent="-342900">
+              <a:lnSpc>
+                <a:spcPct val="200000"/>
+              </a:lnSpc>
+              <a:buFont typeface="Arial" panose="020B0604020202020204" pitchFamily="34" charset="0"/>
+              <a:buChar char="•"/>
+            </a:pPr>
+            <a:r>
+              <a:rPr lang="en-IN" sz="2400" dirty="0">
+                <a:solidFill>
+                  <a:srgbClr val="002060"/>
+                </a:solidFill>
+                <a:latin typeface="Verdana" panose="020B0604030504040204" pitchFamily="34" charset="0"/>
+                <a:ea typeface="Verdana" panose="020B0604030504040204" pitchFamily="34" charset="0"/>
+              </a:rPr>
+              <a:t>CNN based model</a:t>
+            </a:r>
+          </a:p>
+        </p:txBody>
+      </p:sp>
+      <p:sp>
+        <p:nvSpPr>
+          <p:cNvPr id="6" name="Slide Number Placeholder 3">
+            <a:extLst>
+              <a:ext uri="{FF2B5EF4-FFF2-40B4-BE49-F238E27FC236}">
+                <a16:creationId xmlns:a16="http://schemas.microsoft.com/office/drawing/2014/main" id="{8582021D-08E8-4879-942F-0C8B29BE02D7}"/>
+              </a:ext>
+            </a:extLst>
+          </p:cNvPr>
+          <p:cNvSpPr>
+            <a:spLocks noGrp="1"/>
+          </p:cNvSpPr>
+          <p:nvPr>
+            <p:ph type="sldNum" sz="quarter" idx="12"/>
+          </p:nvPr>
+        </p:nvSpPr>
+        <p:spPr>
+          <a:xfrm>
+            <a:off x="7391400" y="6477000"/>
+            <a:ext cx="1600200" cy="195263"/>
+          </a:xfrm>
+        </p:spPr>
+        <p:txBody>
+          <a:bodyPr/>
+          <a:lstStyle/>
+          <a:p>
+            <a:pPr>
+              <a:defRPr/>
+            </a:pPr>
+            <a:fld id="{02246FD1-0723-4B2F-9706-10282F2BA698}" type="slidenum">
+              <a:rPr lang="en-US" smtClean="0">
+                <a:latin typeface="Verdana" panose="020B0604030504040204" pitchFamily="34" charset="0"/>
+                <a:ea typeface="Verdana" panose="020B0604030504040204" pitchFamily="34" charset="0"/>
+              </a:rPr>
+              <a:pPr>
+                <a:defRPr/>
+              </a:pPr>
+              <a:t>16</a:t>
+            </a:fld>
+            <a:r>
+              <a:rPr lang="en-US" dirty="0">
+                <a:latin typeface="Verdana" panose="020B0604030504040204" pitchFamily="34" charset="0"/>
+                <a:ea typeface="Verdana" panose="020B0604030504040204" pitchFamily="34" charset="0"/>
+              </a:rPr>
+              <a:t> </a:t>
+            </a:r>
+          </a:p>
+        </p:txBody>
+      </p:sp>
+    </p:spTree>
+    <p:extLst>
+      <p:ext uri="{BB962C8B-B14F-4D97-AF65-F5344CB8AC3E}">
+        <p14:creationId xmlns:p14="http://schemas.microsoft.com/office/powerpoint/2010/main" val="3695189511"/>
+      </p:ext>
+    </p:extLst>
+  </p:cSld>
+  <p:clrMapOvr>
+    <a:masterClrMapping/>
+  </p:clrMapOvr>
+  <p:timing>
+    <p:tnLst>
+      <p:par>
+        <p:cTn id="1" dur="indefinite" restart="never" nodeType="tmRoot">
+          <p:childTnLst>
+            <p:seq concurrent="1" nextAc="seek">
+              <p:cTn id="2" dur="indefinite" nodeType="mainSeq">
+                <p:childTnLst>
+                  <p:par>
+                    <p:cTn id="3" fill="hold">
+                      <p:stCondLst>
+                        <p:cond delay="indefinite"/>
+                      </p:stCondLst>
+                      <p:childTnLst>
+                        <p:par>
+                          <p:cTn id="4" fill="hold">
+                            <p:stCondLst>
+                              <p:cond delay="0"/>
+                            </p:stCondLst>
+                            <p:childTnLst>
+                              <p:par>
+                                <p:cTn id="5" presetID="2" presetClass="entr" presetSubtype="8" fill="hold" grpId="0" nodeType="clickEffect" nodePh="1">
+                                  <p:stCondLst>
+                                    <p:cond delay="0"/>
+                                  </p:stCondLst>
+                                  <p:endCondLst>
+                                    <p:cond evt="begin" delay="0">
+                                      <p:tn val="5"/>
+                                    </p:cond>
+                                  </p:endCondLst>
+                                  <p:childTnLst>
+                                    <p:set>
+                                      <p:cBhvr>
+                                        <p:cTn id="6" dur="1" fill="hold">
+                                          <p:stCondLst>
+                                            <p:cond delay="0"/>
+                                          </p:stCondLst>
+                                        </p:cTn>
+                                        <p:tgtEl>
+                                          <p:spTgt spid="18">
+                                            <p:txEl>
+                                              <p:pRg st="0" end="0"/>
+                                            </p:txEl>
+                                          </p:spTgt>
+                                        </p:tgtEl>
+                                        <p:attrNameLst>
+                                          <p:attrName>style.visibility</p:attrName>
+                                        </p:attrNameLst>
+                                      </p:cBhvr>
+                                      <p:to>
+                                        <p:strVal val="visible"/>
+                                      </p:to>
+                                    </p:set>
+                                    <p:anim calcmode="lin" valueType="num">
+                                      <p:cBhvr additive="base">
+                                        <p:cTn id="7" dur="500" fill="hold"/>
+                                        <p:tgtEl>
+                                          <p:spTgt spid="18">
+                                            <p:txEl>
+                                              <p:pRg st="0" end="0"/>
+                                            </p:txEl>
+                                          </p:spTgt>
+                                        </p:tgtEl>
+                                        <p:attrNameLst>
+                                          <p:attrName>ppt_x</p:attrName>
+                                        </p:attrNameLst>
+                                      </p:cBhvr>
+                                      <p:tavLst>
+                                        <p:tav tm="0">
+                                          <p:val>
+                                            <p:strVal val="0-#ppt_w/2"/>
+                                          </p:val>
+                                        </p:tav>
+                                        <p:tav tm="100000">
+                                          <p:val>
+                                            <p:strVal val="#ppt_x"/>
+                                          </p:val>
+                                        </p:tav>
+                                      </p:tavLst>
+                                    </p:anim>
+                                    <p:anim calcmode="lin" valueType="num">
+                                      <p:cBhvr additive="base">
+                                        <p:cTn id="8" dur="500" fill="hold"/>
+                                        <p:tgtEl>
+                                          <p:spTgt spid="18">
+                                            <p:txEl>
+                                              <p:pRg st="0" end="0"/>
+                                            </p:txEl>
+                                          </p:spTgt>
+                                        </p:tgtEl>
+                                        <p:attrNameLst>
+                                          <p:attrName>ppt_y</p:attrName>
+                                        </p:attrNameLst>
+                                      </p:cBhvr>
+                                      <p:tavLst>
+                                        <p:tav tm="0">
+                                          <p:val>
+                                            <p:strVal val="#ppt_y"/>
+                                          </p:val>
+                                        </p:tav>
+                                        <p:tav tm="100000">
+                                          <p:val>
+                                            <p:strVal val="#ppt_y"/>
+                                          </p:val>
+                                        </p:tav>
+                                      </p:tavLst>
+                                    </p:anim>
+                                  </p:childTnLst>
+                                </p:cTn>
+                              </p:par>
+                            </p:childTnLst>
+                          </p:cTn>
+                        </p:par>
+                      </p:childTnLst>
+                    </p:cTn>
+                  </p:par>
+                </p:childTnLst>
+              </p:cTn>
+              <p:prevCondLst>
+                <p:cond evt="onPrev" delay="0">
+                  <p:tgtEl>
+                    <p:sldTgt/>
+                  </p:tgtEl>
+                </p:cond>
+              </p:prevCondLst>
+              <p:nextCondLst>
+                <p:cond evt="onNext" delay="0">
+                  <p:tgtEl>
+                    <p:sldTgt/>
+                  </p:tgtEl>
+                </p:cond>
+              </p:nextCondLst>
+            </p:seq>
+          </p:childTnLst>
+        </p:cTn>
+      </p:par>
+    </p:tnLst>
+    <p:bldLst>
+      <p:bldP spid="18" grpId="0" build="p" autoUpdateAnimBg="0"/>
+    </p:bldLst>
+  </p:timing>
+</p:sld>
+</file>
+
+<file path=ppt/slides/slide17.xml><?xml version="1.0" encoding="utf-8"?>
+<p:sld xmlns:a="http://schemas.openxmlformats.org/drawingml/2006/main" xmlns:r="http://schemas.openxmlformats.org/officeDocument/2006/relationships" xmlns:p="http://schemas.openxmlformats.org/presentationml/2006/main">
+  <p:cSld>
+    <p:spTree>
+      <p:nvGrpSpPr>
+        <p:cNvPr id="1" name=""/>
+        <p:cNvGrpSpPr/>
+        <p:nvPr/>
+      </p:nvGrpSpPr>
+      <p:grpSpPr>
+        <a:xfrm>
+          <a:off x="0" y="0"/>
+          <a:ext cx="0" cy="0"/>
+          <a:chOff x="0" y="0"/>
+          <a:chExt cx="0" cy="0"/>
+        </a:xfrm>
+      </p:grpSpPr>
+      <p:sp>
+        <p:nvSpPr>
+          <p:cNvPr id="18" name="Rectangle 3"/>
+          <p:cNvSpPr txBox="1">
+            <a:spLocks noChangeArrowheads="1"/>
+          </p:cNvSpPr>
+          <p:nvPr/>
+        </p:nvSpPr>
+        <p:spPr>
+          <a:xfrm>
+            <a:off x="1543050" y="3371850"/>
+            <a:ext cx="6286500" cy="342900"/>
+          </a:xfrm>
+          <a:prstGeom prst="rect">
+            <a:avLst/>
+          </a:prstGeom>
+        </p:spPr>
+        <p:txBody>
+          <a:bodyPr/>
+          <a:lstStyle/>
+          <a:p>
+            <a:pPr algn="ctr" eaLnBrk="0" fontAlgn="base" hangingPunct="0">
+              <a:spcBef>
+                <a:spcPct val="20000"/>
+              </a:spcBef>
+              <a:spcAft>
+                <a:spcPct val="20000"/>
+              </a:spcAft>
+              <a:defRPr/>
+            </a:pPr>
+            <a:endParaRPr lang="en-US" sz="3600" dirty="0">
+              <a:sym typeface="Symbol" pitchFamily="18" charset="2"/>
+            </a:endParaRPr>
+          </a:p>
+        </p:txBody>
+      </p:sp>
+      <p:sp>
+        <p:nvSpPr>
+          <p:cNvPr id="3" name="Title 2">
+            <a:extLst>
+              <a:ext uri="{FF2B5EF4-FFF2-40B4-BE49-F238E27FC236}">
+                <a16:creationId xmlns:a16="http://schemas.microsoft.com/office/drawing/2014/main" id="{7CBEB6BF-435C-4050-8916-C2A3F4028ED5}"/>
+              </a:ext>
+            </a:extLst>
+          </p:cNvPr>
+          <p:cNvSpPr>
+            <a:spLocks noGrp="1"/>
+          </p:cNvSpPr>
+          <p:nvPr>
+            <p:ph type="title"/>
+          </p:nvPr>
+        </p:nvSpPr>
+        <p:spPr/>
+        <p:txBody>
+          <a:bodyPr>
+            <a:normAutofit/>
+          </a:bodyPr>
+          <a:lstStyle/>
+          <a:p>
+            <a:r>
+              <a:rPr lang="en-IN" sz="2800" dirty="0">
+                <a:latin typeface="Verdana" panose="020B0604030504040204" pitchFamily="34" charset="0"/>
+                <a:ea typeface="Verdana" panose="020B0604030504040204" pitchFamily="34" charset="0"/>
+              </a:rPr>
+              <a:t>Only Image slide</a:t>
+            </a:r>
+          </a:p>
+        </p:txBody>
+      </p:sp>
+      <p:sp>
+        <p:nvSpPr>
+          <p:cNvPr id="6" name="Slide Number Placeholder 3">
+            <a:extLst>
+              <a:ext uri="{FF2B5EF4-FFF2-40B4-BE49-F238E27FC236}">
+                <a16:creationId xmlns:a16="http://schemas.microsoft.com/office/drawing/2014/main" id="{8582021D-08E8-4879-942F-0C8B29BE02D7}"/>
+              </a:ext>
+            </a:extLst>
+          </p:cNvPr>
+          <p:cNvSpPr>
+            <a:spLocks noGrp="1"/>
+          </p:cNvSpPr>
+          <p:nvPr>
+            <p:ph type="sldNum" sz="quarter" idx="12"/>
+          </p:nvPr>
+        </p:nvSpPr>
+        <p:spPr>
+          <a:xfrm>
+            <a:off x="7391400" y="6477000"/>
+            <a:ext cx="1600200" cy="195263"/>
+          </a:xfrm>
+        </p:spPr>
+        <p:txBody>
+          <a:bodyPr/>
+          <a:lstStyle/>
+          <a:p>
+            <a:pPr>
+              <a:defRPr/>
+            </a:pPr>
+            <a:fld id="{02246FD1-0723-4B2F-9706-10282F2BA698}" type="slidenum">
+              <a:rPr lang="en-US" smtClean="0">
+                <a:latin typeface="Verdana" panose="020B0604030504040204" pitchFamily="34" charset="0"/>
+                <a:ea typeface="Verdana" panose="020B0604030504040204" pitchFamily="34" charset="0"/>
+              </a:rPr>
+              <a:pPr>
+                <a:defRPr/>
+              </a:pPr>
+              <a:t>17</a:t>
             </a:fld>
             <a:r>
               <a:rPr lang="en-US" dirty="0">
@@ -5230,7 +7080,7 @@
 </p:sld>
 </file>
 
-<file path=ppt/slides/slide13.xml><?xml version="1.0" encoding="utf-8"?>
+<file path=ppt/slides/slide18.xml><?xml version="1.0" encoding="utf-8"?>
 <p:sld xmlns:a="http://schemas.openxmlformats.org/drawingml/2006/main" xmlns:r="http://schemas.openxmlformats.org/officeDocument/2006/relationships" xmlns:p="http://schemas.openxmlformats.org/presentationml/2006/main">
   <p:cSld>
     <p:spTree>
@@ -5408,7 +7258,7 @@
               <a:pPr>
                 <a:defRPr/>
               </a:pPr>
-              <a:t>13</a:t>
+              <a:t>18</a:t>
             </a:fld>
             <a:r>
               <a:rPr lang="en-US" dirty="0">
@@ -5869,7 +7719,7 @@
 </p:sld>
 </file>
 
-<file path=ppt/slides/slide14.xml><?xml version="1.0" encoding="utf-8"?>
+<file path=ppt/slides/slide19.xml><?xml version="1.0" encoding="utf-8"?>
 <p:sld xmlns:a="http://schemas.openxmlformats.org/drawingml/2006/main" xmlns:r="http://schemas.openxmlformats.org/officeDocument/2006/relationships" xmlns:p="http://schemas.openxmlformats.org/presentationml/2006/main">
   <p:cSld>
     <p:spTree>
@@ -6047,7 +7897,7 @@
               <a:pPr>
                 <a:defRPr/>
               </a:pPr>
-              <a:t>14</a:t>
+              <a:t>19</a:t>
             </a:fld>
             <a:r>
               <a:rPr lang="en-US" dirty="0">
@@ -6243,7 +8093,7 @@
 </p:sld>
 </file>
 
-<file path=ppt/slides/slide15.xml><?xml version="1.0" encoding="utf-8"?>
+<file path=ppt/slides/slide2.xml><?xml version="1.0" encoding="utf-8"?>
 <p:sld xmlns:a="http://schemas.openxmlformats.org/drawingml/2006/main" xmlns:r="http://schemas.openxmlformats.org/officeDocument/2006/relationships" xmlns:p="http://schemas.openxmlformats.org/presentationml/2006/main">
   <p:cSld>
     <p:spTree>
@@ -6262,6 +8112,389 @@
       </p:grpSpPr>
       <p:sp>
         <p:nvSpPr>
+          <p:cNvPr id="4" name="Slide Number Placeholder 3"/>
+          <p:cNvSpPr>
+            <a:spLocks noGrp="1"/>
+          </p:cNvSpPr>
+          <p:nvPr>
+            <p:ph type="sldNum" sz="quarter" idx="12"/>
+          </p:nvPr>
+        </p:nvSpPr>
+        <p:spPr>
+          <a:xfrm>
+            <a:off x="7391400" y="6477000"/>
+            <a:ext cx="1600200" cy="195263"/>
+          </a:xfrm>
+        </p:spPr>
+        <p:txBody>
+          <a:bodyPr/>
+          <a:lstStyle/>
+          <a:p>
+            <a:pPr>
+              <a:defRPr/>
+            </a:pPr>
+            <a:fld id="{02246FD1-0723-4B2F-9706-10282F2BA698}" type="slidenum">
+              <a:rPr lang="en-US" smtClean="0">
+                <a:latin typeface="Verdana" panose="020B0604030504040204" pitchFamily="34" charset="0"/>
+                <a:ea typeface="Verdana" panose="020B0604030504040204" pitchFamily="34" charset="0"/>
+              </a:rPr>
+              <a:pPr>
+                <a:defRPr/>
+              </a:pPr>
+              <a:t>2</a:t>
+            </a:fld>
+            <a:r>
+              <a:rPr lang="en-US" dirty="0">
+                <a:latin typeface="Verdana" panose="020B0604030504040204" pitchFamily="34" charset="0"/>
+                <a:ea typeface="Verdana" panose="020B0604030504040204" pitchFamily="34" charset="0"/>
+              </a:rPr>
+              <a:t> </a:t>
+            </a:r>
+          </a:p>
+        </p:txBody>
+      </p:sp>
+      <p:sp>
+        <p:nvSpPr>
+          <p:cNvPr id="18" name="Rectangle 3"/>
+          <p:cNvSpPr txBox="1">
+            <a:spLocks noChangeArrowheads="1"/>
+          </p:cNvSpPr>
+          <p:nvPr/>
+        </p:nvSpPr>
+        <p:spPr>
+          <a:xfrm>
+            <a:off x="1543050" y="3371850"/>
+            <a:ext cx="6286500" cy="342900"/>
+          </a:xfrm>
+          <a:prstGeom prst="rect">
+            <a:avLst/>
+          </a:prstGeom>
+        </p:spPr>
+        <p:txBody>
+          <a:bodyPr/>
+          <a:lstStyle/>
+          <a:p>
+            <a:pPr algn="ctr" eaLnBrk="0" fontAlgn="base" hangingPunct="0">
+              <a:spcBef>
+                <a:spcPct val="20000"/>
+              </a:spcBef>
+              <a:spcAft>
+                <a:spcPct val="20000"/>
+              </a:spcAft>
+              <a:defRPr/>
+            </a:pPr>
+            <a:endParaRPr lang="en-US" sz="3600" dirty="0">
+              <a:sym typeface="Symbol" pitchFamily="18" charset="2"/>
+            </a:endParaRPr>
+          </a:p>
+        </p:txBody>
+      </p:sp>
+      <p:sp>
+        <p:nvSpPr>
+          <p:cNvPr id="3" name="Title 2">
+            <a:extLst>
+              <a:ext uri="{FF2B5EF4-FFF2-40B4-BE49-F238E27FC236}">
+                <a16:creationId xmlns:a16="http://schemas.microsoft.com/office/drawing/2014/main" id="{7CBEB6BF-435C-4050-8916-C2A3F4028ED5}"/>
+              </a:ext>
+            </a:extLst>
+          </p:cNvPr>
+          <p:cNvSpPr>
+            <a:spLocks noGrp="1"/>
+          </p:cNvSpPr>
+          <p:nvPr>
+            <p:ph type="title"/>
+          </p:nvPr>
+        </p:nvSpPr>
+        <p:spPr/>
+        <p:txBody>
+          <a:bodyPr>
+            <a:normAutofit/>
+          </a:bodyPr>
+          <a:lstStyle/>
+          <a:p>
+            <a:r>
+              <a:rPr lang="en-IN" sz="2800" dirty="0">
+                <a:latin typeface="Verdana" panose="020B0604030504040204" pitchFamily="34" charset="0"/>
+                <a:ea typeface="Verdana" panose="020B0604030504040204" pitchFamily="34" charset="0"/>
+              </a:rPr>
+              <a:t>Content</a:t>
+            </a:r>
+          </a:p>
+        </p:txBody>
+      </p:sp>
+      <p:sp>
+        <p:nvSpPr>
+          <p:cNvPr id="7" name="TextBox 6">
+            <a:extLst>
+              <a:ext uri="{FF2B5EF4-FFF2-40B4-BE49-F238E27FC236}">
+                <a16:creationId xmlns:a16="http://schemas.microsoft.com/office/drawing/2014/main" id="{CE674E32-7A29-496C-AAED-9D3511E24D63}"/>
+              </a:ext>
+            </a:extLst>
+          </p:cNvPr>
+          <p:cNvSpPr txBox="1"/>
+          <p:nvPr/>
+        </p:nvSpPr>
+        <p:spPr>
+          <a:xfrm>
+            <a:off x="609600" y="762000"/>
+            <a:ext cx="8153400" cy="3046988"/>
+          </a:xfrm>
+          <a:prstGeom prst="rect">
+            <a:avLst/>
+          </a:prstGeom>
+          <a:noFill/>
+        </p:spPr>
+        <p:txBody>
+          <a:bodyPr wrap="square" rtlCol="0">
+            <a:spAutoFit/>
+          </a:bodyPr>
+          <a:lstStyle/>
+          <a:p>
+            <a:pPr marL="342900" indent="-342900">
+              <a:lnSpc>
+                <a:spcPct val="200000"/>
+              </a:lnSpc>
+              <a:buFont typeface="Arial" panose="020B0604020202020204" pitchFamily="34" charset="0"/>
+              <a:buChar char="•"/>
+            </a:pPr>
+            <a:r>
+              <a:rPr lang="en-IN" sz="2400" dirty="0">
+                <a:solidFill>
+                  <a:srgbClr val="C00000"/>
+                </a:solidFill>
+                <a:latin typeface="Verdana" panose="020B0604030504040204" pitchFamily="34" charset="0"/>
+                <a:ea typeface="Verdana" panose="020B0604030504040204" pitchFamily="34" charset="0"/>
+              </a:rPr>
+              <a:t>Project</a:t>
+            </a:r>
+          </a:p>
+          <a:p>
+            <a:pPr marL="342900" indent="-342900">
+              <a:lnSpc>
+                <a:spcPct val="200000"/>
+              </a:lnSpc>
+              <a:buFont typeface="Arial" panose="020B0604020202020204" pitchFamily="34" charset="0"/>
+              <a:buChar char="•"/>
+            </a:pPr>
+            <a:r>
+              <a:rPr lang="en-IN" sz="2400" dirty="0">
+                <a:solidFill>
+                  <a:srgbClr val="002060"/>
+                </a:solidFill>
+                <a:latin typeface="Verdana" panose="020B0604030504040204" pitchFamily="34" charset="0"/>
+                <a:ea typeface="Verdana" panose="020B0604030504040204" pitchFamily="34" charset="0"/>
+              </a:rPr>
+              <a:t>Domain</a:t>
+            </a:r>
+          </a:p>
+          <a:p>
+            <a:pPr marL="342900" indent="-342900">
+              <a:lnSpc>
+                <a:spcPct val="200000"/>
+              </a:lnSpc>
+              <a:buFont typeface="Arial" panose="020B0604020202020204" pitchFamily="34" charset="0"/>
+              <a:buChar char="•"/>
+            </a:pPr>
+            <a:r>
+              <a:rPr lang="en-IN" sz="2400" dirty="0">
+                <a:solidFill>
+                  <a:srgbClr val="C00000"/>
+                </a:solidFill>
+                <a:latin typeface="Verdana" panose="020B0604030504040204" pitchFamily="34" charset="0"/>
+                <a:ea typeface="Verdana" panose="020B0604030504040204" pitchFamily="34" charset="0"/>
+              </a:rPr>
+              <a:t>Technology</a:t>
+            </a:r>
+          </a:p>
+          <a:p>
+            <a:pPr marL="342900" indent="-342900">
+              <a:lnSpc>
+                <a:spcPct val="200000"/>
+              </a:lnSpc>
+              <a:buFont typeface="Arial" panose="020B0604020202020204" pitchFamily="34" charset="0"/>
+              <a:buChar char="•"/>
+            </a:pPr>
+            <a:r>
+              <a:rPr lang="en-IN" sz="2400" dirty="0">
+                <a:solidFill>
+                  <a:srgbClr val="002060"/>
+                </a:solidFill>
+                <a:latin typeface="Verdana" panose="020B0604030504040204" pitchFamily="34" charset="0"/>
+                <a:ea typeface="Verdana" panose="020B0604030504040204" pitchFamily="34" charset="0"/>
+              </a:rPr>
+              <a:t>Tool</a:t>
+            </a:r>
+          </a:p>
+        </p:txBody>
+      </p:sp>
+    </p:spTree>
+  </p:cSld>
+  <p:clrMapOvr>
+    <a:masterClrMapping/>
+  </p:clrMapOvr>
+  <p:timing>
+    <p:tnLst>
+      <p:par>
+        <p:cTn id="1" dur="indefinite" restart="never" nodeType="tmRoot">
+          <p:childTnLst>
+            <p:seq concurrent="1" nextAc="seek">
+              <p:cTn id="2" dur="indefinite" nodeType="mainSeq">
+                <p:childTnLst>
+                  <p:par>
+                    <p:cTn id="3" fill="hold">
+                      <p:stCondLst>
+                        <p:cond delay="indefinite"/>
+                      </p:stCondLst>
+                      <p:childTnLst>
+                        <p:par>
+                          <p:cTn id="4" fill="hold">
+                            <p:stCondLst>
+                              <p:cond delay="0"/>
+                            </p:stCondLst>
+                            <p:childTnLst>
+                              <p:par>
+                                <p:cTn id="5" presetID="2" presetClass="entr" presetSubtype="8" fill="hold" grpId="0" nodeType="clickEffect" nodePh="1">
+                                  <p:stCondLst>
+                                    <p:cond delay="0"/>
+                                  </p:stCondLst>
+                                  <p:endCondLst>
+                                    <p:cond evt="begin" delay="0">
+                                      <p:tn val="5"/>
+                                    </p:cond>
+                                  </p:endCondLst>
+                                  <p:childTnLst>
+                                    <p:set>
+                                      <p:cBhvr>
+                                        <p:cTn id="6" dur="1" fill="hold">
+                                          <p:stCondLst>
+                                            <p:cond delay="0"/>
+                                          </p:stCondLst>
+                                        </p:cTn>
+                                        <p:tgtEl>
+                                          <p:spTgt spid="18">
+                                            <p:txEl>
+                                              <p:pRg st="0" end="0"/>
+                                            </p:txEl>
+                                          </p:spTgt>
+                                        </p:tgtEl>
+                                        <p:attrNameLst>
+                                          <p:attrName>style.visibility</p:attrName>
+                                        </p:attrNameLst>
+                                      </p:cBhvr>
+                                      <p:to>
+                                        <p:strVal val="visible"/>
+                                      </p:to>
+                                    </p:set>
+                                    <p:anim calcmode="lin" valueType="num">
+                                      <p:cBhvr additive="base">
+                                        <p:cTn id="7" dur="500" fill="hold"/>
+                                        <p:tgtEl>
+                                          <p:spTgt spid="18">
+                                            <p:txEl>
+                                              <p:pRg st="0" end="0"/>
+                                            </p:txEl>
+                                          </p:spTgt>
+                                        </p:tgtEl>
+                                        <p:attrNameLst>
+                                          <p:attrName>ppt_x</p:attrName>
+                                        </p:attrNameLst>
+                                      </p:cBhvr>
+                                      <p:tavLst>
+                                        <p:tav tm="0">
+                                          <p:val>
+                                            <p:strVal val="0-#ppt_w/2"/>
+                                          </p:val>
+                                        </p:tav>
+                                        <p:tav tm="100000">
+                                          <p:val>
+                                            <p:strVal val="#ppt_x"/>
+                                          </p:val>
+                                        </p:tav>
+                                      </p:tavLst>
+                                    </p:anim>
+                                    <p:anim calcmode="lin" valueType="num">
+                                      <p:cBhvr additive="base">
+                                        <p:cTn id="8" dur="500" fill="hold"/>
+                                        <p:tgtEl>
+                                          <p:spTgt spid="18">
+                                            <p:txEl>
+                                              <p:pRg st="0" end="0"/>
+                                            </p:txEl>
+                                          </p:spTgt>
+                                        </p:tgtEl>
+                                        <p:attrNameLst>
+                                          <p:attrName>ppt_y</p:attrName>
+                                        </p:attrNameLst>
+                                      </p:cBhvr>
+                                      <p:tavLst>
+                                        <p:tav tm="0">
+                                          <p:val>
+                                            <p:strVal val="#ppt_y"/>
+                                          </p:val>
+                                        </p:tav>
+                                        <p:tav tm="100000">
+                                          <p:val>
+                                            <p:strVal val="#ppt_y"/>
+                                          </p:val>
+                                        </p:tav>
+                                      </p:tavLst>
+                                    </p:anim>
+                                  </p:childTnLst>
+                                </p:cTn>
+                              </p:par>
+                            </p:childTnLst>
+                          </p:cTn>
+                        </p:par>
+                      </p:childTnLst>
+                    </p:cTn>
+                  </p:par>
+                </p:childTnLst>
+              </p:cTn>
+              <p:prevCondLst>
+                <p:cond evt="onPrev" delay="0">
+                  <p:tgtEl>
+                    <p:sldTgt/>
+                  </p:tgtEl>
+                </p:cond>
+              </p:prevCondLst>
+              <p:nextCondLst>
+                <p:cond evt="onNext" delay="0">
+                  <p:tgtEl>
+                    <p:sldTgt/>
+                  </p:tgtEl>
+                </p:cond>
+              </p:nextCondLst>
+            </p:seq>
+          </p:childTnLst>
+        </p:cTn>
+      </p:par>
+    </p:tnLst>
+    <p:bldLst>
+      <p:bldP spid="18" grpId="0" build="p" autoUpdateAnimBg="0"/>
+    </p:bldLst>
+  </p:timing>
+</p:sld>
+</file>
+
+<file path=ppt/slides/slide20.xml><?xml version="1.0" encoding="utf-8"?>
+<p:sld xmlns:a="http://schemas.openxmlformats.org/drawingml/2006/main" xmlns:r="http://schemas.openxmlformats.org/officeDocument/2006/relationships" xmlns:p="http://schemas.openxmlformats.org/presentationml/2006/main">
+  <p:cSld>
+    <p:spTree>
+      <p:nvGrpSpPr>
+        <p:cNvPr id="1" name=""/>
+        <p:cNvGrpSpPr/>
+        <p:nvPr/>
+      </p:nvGrpSpPr>
+      <p:grpSpPr>
+        <a:xfrm>
+          <a:off x="0" y="0"/>
+          <a:ext cx="0" cy="0"/>
+          <a:chOff x="0" y="0"/>
+          <a:chExt cx="0" cy="0"/>
+        </a:xfrm>
+      </p:grpSpPr>
+      <p:sp>
+        <p:nvSpPr>
           <p:cNvPr id="18" name="Rectangle 3"/>
           <p:cNvSpPr txBox="1">
             <a:spLocks noChangeArrowheads="1"/>
@@ -6468,7 +8701,7 @@
               <a:pPr>
                 <a:defRPr/>
               </a:pPr>
-              <a:t>15</a:t>
+              <a:t>20</a:t>
             </a:fld>
             <a:r>
               <a:rPr lang="en-US" dirty="0">
@@ -6634,7 +8867,7 @@
 </p:sld>
 </file>
 
-<file path=ppt/slides/slide16.xml><?xml version="1.0" encoding="utf-8"?>
+<file path=ppt/slides/slide21.xml><?xml version="1.0" encoding="utf-8"?>
 <p:sld xmlns:a="http://schemas.openxmlformats.org/drawingml/2006/main" xmlns:r="http://schemas.openxmlformats.org/officeDocument/2006/relationships" xmlns:p="http://schemas.openxmlformats.org/presentationml/2006/main">
   <p:cSld>
     <p:spTree>
@@ -6795,7 +9028,7 @@
               <a:pPr>
                 <a:defRPr/>
               </a:pPr>
-              <a:t>16</a:t>
+              <a:t>21</a:t>
             </a:fld>
             <a:r>
               <a:rPr lang="en-US"/>
@@ -6813,7 +9046,7 @@
 </p:sld>
 </file>
 
-<file path=ppt/slides/slide17.xml><?xml version="1.0" encoding="utf-8"?>
+<file path=ppt/slides/slide22.xml><?xml version="1.0" encoding="utf-8"?>
 <p:sld xmlns:a="http://schemas.openxmlformats.org/drawingml/2006/main" xmlns:r="http://schemas.openxmlformats.org/officeDocument/2006/relationships" xmlns:p="http://schemas.openxmlformats.org/presentationml/2006/main">
   <p:cSld>
     <p:spTree>
@@ -6859,7 +9092,7 @@
               <a:pPr>
                 <a:defRPr/>
               </a:pPr>
-              <a:t>17</a:t>
+              <a:t>22</a:t>
             </a:fld>
             <a:r>
               <a:rPr lang="en-US"/>
@@ -6952,389 +9185,6 @@
   <p:clrMapOvr>
     <a:masterClrMapping/>
   </p:clrMapOvr>
-</p:sld>
-</file>
-
-<file path=ppt/slides/slide2.xml><?xml version="1.0" encoding="utf-8"?>
-<p:sld xmlns:a="http://schemas.openxmlformats.org/drawingml/2006/main" xmlns:r="http://schemas.openxmlformats.org/officeDocument/2006/relationships" xmlns:p="http://schemas.openxmlformats.org/presentationml/2006/main">
-  <p:cSld>
-    <p:spTree>
-      <p:nvGrpSpPr>
-        <p:cNvPr id="1" name=""/>
-        <p:cNvGrpSpPr/>
-        <p:nvPr/>
-      </p:nvGrpSpPr>
-      <p:grpSpPr>
-        <a:xfrm>
-          <a:off x="0" y="0"/>
-          <a:ext cx="0" cy="0"/>
-          <a:chOff x="0" y="0"/>
-          <a:chExt cx="0" cy="0"/>
-        </a:xfrm>
-      </p:grpSpPr>
-      <p:sp>
-        <p:nvSpPr>
-          <p:cNvPr id="4" name="Slide Number Placeholder 3"/>
-          <p:cNvSpPr>
-            <a:spLocks noGrp="1"/>
-          </p:cNvSpPr>
-          <p:nvPr>
-            <p:ph type="sldNum" sz="quarter" idx="12"/>
-          </p:nvPr>
-        </p:nvSpPr>
-        <p:spPr>
-          <a:xfrm>
-            <a:off x="7391400" y="6477000"/>
-            <a:ext cx="1600200" cy="195263"/>
-          </a:xfrm>
-        </p:spPr>
-        <p:txBody>
-          <a:bodyPr/>
-          <a:lstStyle/>
-          <a:p>
-            <a:pPr>
-              <a:defRPr/>
-            </a:pPr>
-            <a:fld id="{02246FD1-0723-4B2F-9706-10282F2BA698}" type="slidenum">
-              <a:rPr lang="en-US" smtClean="0">
-                <a:latin typeface="Verdana" panose="020B0604030504040204" pitchFamily="34" charset="0"/>
-                <a:ea typeface="Verdana" panose="020B0604030504040204" pitchFamily="34" charset="0"/>
-              </a:rPr>
-              <a:pPr>
-                <a:defRPr/>
-              </a:pPr>
-              <a:t>2</a:t>
-            </a:fld>
-            <a:r>
-              <a:rPr lang="en-US" dirty="0">
-                <a:latin typeface="Verdana" panose="020B0604030504040204" pitchFamily="34" charset="0"/>
-                <a:ea typeface="Verdana" panose="020B0604030504040204" pitchFamily="34" charset="0"/>
-              </a:rPr>
-              <a:t> </a:t>
-            </a:r>
-          </a:p>
-        </p:txBody>
-      </p:sp>
-      <p:sp>
-        <p:nvSpPr>
-          <p:cNvPr id="18" name="Rectangle 3"/>
-          <p:cNvSpPr txBox="1">
-            <a:spLocks noChangeArrowheads="1"/>
-          </p:cNvSpPr>
-          <p:nvPr/>
-        </p:nvSpPr>
-        <p:spPr>
-          <a:xfrm>
-            <a:off x="1543050" y="3371850"/>
-            <a:ext cx="6286500" cy="342900"/>
-          </a:xfrm>
-          <a:prstGeom prst="rect">
-            <a:avLst/>
-          </a:prstGeom>
-        </p:spPr>
-        <p:txBody>
-          <a:bodyPr/>
-          <a:lstStyle/>
-          <a:p>
-            <a:pPr algn="ctr" eaLnBrk="0" fontAlgn="base" hangingPunct="0">
-              <a:spcBef>
-                <a:spcPct val="20000"/>
-              </a:spcBef>
-              <a:spcAft>
-                <a:spcPct val="20000"/>
-              </a:spcAft>
-              <a:defRPr/>
-            </a:pPr>
-            <a:endParaRPr lang="en-US" sz="3600" dirty="0">
-              <a:sym typeface="Symbol" pitchFamily="18" charset="2"/>
-            </a:endParaRPr>
-          </a:p>
-        </p:txBody>
-      </p:sp>
-      <p:sp>
-        <p:nvSpPr>
-          <p:cNvPr id="3" name="Title 2">
-            <a:extLst>
-              <a:ext uri="{FF2B5EF4-FFF2-40B4-BE49-F238E27FC236}">
-                <a16:creationId xmlns:a16="http://schemas.microsoft.com/office/drawing/2014/main" id="{7CBEB6BF-435C-4050-8916-C2A3F4028ED5}"/>
-              </a:ext>
-            </a:extLst>
-          </p:cNvPr>
-          <p:cNvSpPr>
-            <a:spLocks noGrp="1"/>
-          </p:cNvSpPr>
-          <p:nvPr>
-            <p:ph type="title"/>
-          </p:nvPr>
-        </p:nvSpPr>
-        <p:spPr/>
-        <p:txBody>
-          <a:bodyPr>
-            <a:normAutofit/>
-          </a:bodyPr>
-          <a:lstStyle/>
-          <a:p>
-            <a:r>
-              <a:rPr lang="en-IN" sz="2800" dirty="0">
-                <a:latin typeface="Verdana" panose="020B0604030504040204" pitchFamily="34" charset="0"/>
-                <a:ea typeface="Verdana" panose="020B0604030504040204" pitchFamily="34" charset="0"/>
-              </a:rPr>
-              <a:t>Content</a:t>
-            </a:r>
-          </a:p>
-        </p:txBody>
-      </p:sp>
-      <p:sp>
-        <p:nvSpPr>
-          <p:cNvPr id="7" name="TextBox 6">
-            <a:extLst>
-              <a:ext uri="{FF2B5EF4-FFF2-40B4-BE49-F238E27FC236}">
-                <a16:creationId xmlns:a16="http://schemas.microsoft.com/office/drawing/2014/main" id="{CE674E32-7A29-496C-AAED-9D3511E24D63}"/>
-              </a:ext>
-            </a:extLst>
-          </p:cNvPr>
-          <p:cNvSpPr txBox="1"/>
-          <p:nvPr/>
-        </p:nvSpPr>
-        <p:spPr>
-          <a:xfrm>
-            <a:off x="609600" y="762000"/>
-            <a:ext cx="8153400" cy="3046988"/>
-          </a:xfrm>
-          <a:prstGeom prst="rect">
-            <a:avLst/>
-          </a:prstGeom>
-          <a:noFill/>
-        </p:spPr>
-        <p:txBody>
-          <a:bodyPr wrap="square" rtlCol="0">
-            <a:spAutoFit/>
-          </a:bodyPr>
-          <a:lstStyle/>
-          <a:p>
-            <a:pPr marL="342900" indent="-342900">
-              <a:lnSpc>
-                <a:spcPct val="200000"/>
-              </a:lnSpc>
-              <a:buFont typeface="Arial" panose="020B0604020202020204" pitchFamily="34" charset="0"/>
-              <a:buChar char="•"/>
-            </a:pPr>
-            <a:r>
-              <a:rPr lang="en-IN" sz="2400" dirty="0">
-                <a:solidFill>
-                  <a:srgbClr val="C00000"/>
-                </a:solidFill>
-                <a:latin typeface="Verdana" panose="020B0604030504040204" pitchFamily="34" charset="0"/>
-                <a:ea typeface="Verdana" panose="020B0604030504040204" pitchFamily="34" charset="0"/>
-              </a:rPr>
-              <a:t>Project</a:t>
-            </a:r>
-          </a:p>
-          <a:p>
-            <a:pPr marL="342900" indent="-342900">
-              <a:lnSpc>
-                <a:spcPct val="200000"/>
-              </a:lnSpc>
-              <a:buFont typeface="Arial" panose="020B0604020202020204" pitchFamily="34" charset="0"/>
-              <a:buChar char="•"/>
-            </a:pPr>
-            <a:r>
-              <a:rPr lang="en-IN" sz="2400" dirty="0">
-                <a:solidFill>
-                  <a:srgbClr val="002060"/>
-                </a:solidFill>
-                <a:latin typeface="Verdana" panose="020B0604030504040204" pitchFamily="34" charset="0"/>
-                <a:ea typeface="Verdana" panose="020B0604030504040204" pitchFamily="34" charset="0"/>
-              </a:rPr>
-              <a:t>Domain</a:t>
-            </a:r>
-          </a:p>
-          <a:p>
-            <a:pPr marL="342900" indent="-342900">
-              <a:lnSpc>
-                <a:spcPct val="200000"/>
-              </a:lnSpc>
-              <a:buFont typeface="Arial" panose="020B0604020202020204" pitchFamily="34" charset="0"/>
-              <a:buChar char="•"/>
-            </a:pPr>
-            <a:r>
-              <a:rPr lang="en-IN" sz="2400" dirty="0">
-                <a:solidFill>
-                  <a:srgbClr val="C00000"/>
-                </a:solidFill>
-                <a:latin typeface="Verdana" panose="020B0604030504040204" pitchFamily="34" charset="0"/>
-                <a:ea typeface="Verdana" panose="020B0604030504040204" pitchFamily="34" charset="0"/>
-              </a:rPr>
-              <a:t>Technology</a:t>
-            </a:r>
-          </a:p>
-          <a:p>
-            <a:pPr marL="342900" indent="-342900">
-              <a:lnSpc>
-                <a:spcPct val="200000"/>
-              </a:lnSpc>
-              <a:buFont typeface="Arial" panose="020B0604020202020204" pitchFamily="34" charset="0"/>
-              <a:buChar char="•"/>
-            </a:pPr>
-            <a:r>
-              <a:rPr lang="en-IN" sz="2400" dirty="0">
-                <a:solidFill>
-                  <a:srgbClr val="002060"/>
-                </a:solidFill>
-                <a:latin typeface="Verdana" panose="020B0604030504040204" pitchFamily="34" charset="0"/>
-                <a:ea typeface="Verdana" panose="020B0604030504040204" pitchFamily="34" charset="0"/>
-              </a:rPr>
-              <a:t>Tool</a:t>
-            </a:r>
-          </a:p>
-        </p:txBody>
-      </p:sp>
-    </p:spTree>
-  </p:cSld>
-  <p:clrMapOvr>
-    <a:masterClrMapping/>
-  </p:clrMapOvr>
-  <p:timing>
-    <p:tnLst>
-      <p:par>
-        <p:cTn id="1" dur="indefinite" restart="never" nodeType="tmRoot">
-          <p:childTnLst>
-            <p:seq concurrent="1" nextAc="seek">
-              <p:cTn id="2" dur="indefinite" nodeType="mainSeq">
-                <p:childTnLst>
-                  <p:par>
-                    <p:cTn id="3" fill="hold">
-                      <p:stCondLst>
-                        <p:cond delay="indefinite"/>
-                      </p:stCondLst>
-                      <p:childTnLst>
-                        <p:par>
-                          <p:cTn id="4" fill="hold">
-                            <p:stCondLst>
-                              <p:cond delay="0"/>
-                            </p:stCondLst>
-                            <p:childTnLst>
-                              <p:par>
-                                <p:cTn id="5" presetID="2" presetClass="entr" presetSubtype="8" fill="hold" grpId="0" nodeType="clickEffect" nodePh="1">
-                                  <p:stCondLst>
-                                    <p:cond delay="0"/>
-                                  </p:stCondLst>
-                                  <p:endCondLst>
-                                    <p:cond evt="begin" delay="0">
-                                      <p:tn val="5"/>
-                                    </p:cond>
-                                  </p:endCondLst>
-                                  <p:childTnLst>
-                                    <p:set>
-                                      <p:cBhvr>
-                                        <p:cTn id="6" dur="1" fill="hold">
-                                          <p:stCondLst>
-                                            <p:cond delay="0"/>
-                                          </p:stCondLst>
-                                        </p:cTn>
-                                        <p:tgtEl>
-                                          <p:spTgt spid="18">
-                                            <p:txEl>
-                                              <p:pRg st="0" end="0"/>
-                                            </p:txEl>
-                                          </p:spTgt>
-                                        </p:tgtEl>
-                                        <p:attrNameLst>
-                                          <p:attrName>style.visibility</p:attrName>
-                                        </p:attrNameLst>
-                                      </p:cBhvr>
-                                      <p:to>
-                                        <p:strVal val="visible"/>
-                                      </p:to>
-                                    </p:set>
-                                    <p:anim calcmode="lin" valueType="num">
-                                      <p:cBhvr additive="base">
-                                        <p:cTn id="7" dur="500" fill="hold"/>
-                                        <p:tgtEl>
-                                          <p:spTgt spid="18">
-                                            <p:txEl>
-                                              <p:pRg st="0" end="0"/>
-                                            </p:txEl>
-                                          </p:spTgt>
-                                        </p:tgtEl>
-                                        <p:attrNameLst>
-                                          <p:attrName>ppt_x</p:attrName>
-                                        </p:attrNameLst>
-                                      </p:cBhvr>
-                                      <p:tavLst>
-                                        <p:tav tm="0">
-                                          <p:val>
-                                            <p:strVal val="0-#ppt_w/2"/>
-                                          </p:val>
-                                        </p:tav>
-                                        <p:tav tm="100000">
-                                          <p:val>
-                                            <p:strVal val="#ppt_x"/>
-                                          </p:val>
-                                        </p:tav>
-                                      </p:tavLst>
-                                    </p:anim>
-                                    <p:anim calcmode="lin" valueType="num">
-                                      <p:cBhvr additive="base">
-                                        <p:cTn id="8" dur="500" fill="hold"/>
-                                        <p:tgtEl>
-                                          <p:spTgt spid="18">
-                                            <p:txEl>
-                                              <p:pRg st="0" end="0"/>
-                                            </p:txEl>
-                                          </p:spTgt>
-                                        </p:tgtEl>
-                                        <p:attrNameLst>
-                                          <p:attrName>ppt_y</p:attrName>
-                                        </p:attrNameLst>
-                                      </p:cBhvr>
-                                      <p:tavLst>
-                                        <p:tav tm="0">
-                                          <p:val>
-                                            <p:strVal val="#ppt_y"/>
-                                          </p:val>
-                                        </p:tav>
-                                        <p:tav tm="100000">
-                                          <p:val>
-                                            <p:strVal val="#ppt_y"/>
-                                          </p:val>
-                                        </p:tav>
-                                      </p:tavLst>
-                                    </p:anim>
-                                  </p:childTnLst>
-                                </p:cTn>
-                              </p:par>
-                            </p:childTnLst>
-                          </p:cTn>
-                        </p:par>
-                      </p:childTnLst>
-                    </p:cTn>
-                  </p:par>
-                </p:childTnLst>
-              </p:cTn>
-              <p:prevCondLst>
-                <p:cond evt="onPrev" delay="0">
-                  <p:tgtEl>
-                    <p:sldTgt/>
-                  </p:tgtEl>
-                </p:cond>
-              </p:prevCondLst>
-              <p:nextCondLst>
-                <p:cond evt="onNext" delay="0">
-                  <p:tgtEl>
-                    <p:sldTgt/>
-                  </p:tgtEl>
-                </p:cond>
-              </p:nextCondLst>
-            </p:seq>
-          </p:childTnLst>
-        </p:cTn>
-      </p:par>
-    </p:tnLst>
-    <p:bldLst>
-      <p:bldP spid="18" grpId="0" build="p" autoUpdateAnimBg="0"/>
-    </p:bldLst>
-  </p:timing>
 </p:sld>
 </file>
 
@@ -7781,13 +9631,13 @@
           <a:p>
             <a:r>
               <a:rPr lang="en-IN" dirty="0"/>
-              <a:t>TensorFlow, Keras</a:t>
+              <a:t>PyTorch</a:t>
             </a:r>
           </a:p>
           <a:p>
             <a:r>
               <a:rPr lang="en-IN" dirty="0"/>
-              <a:t>Paperspace, Kaggle kernels</a:t>
+              <a:t>Kaggle kernels, P100 GPU</a:t>
             </a:r>
           </a:p>
           <a:p>
@@ -8080,7 +9930,7 @@
                   <a:srgbClr val="C00000"/>
                 </a:solidFill>
               </a:rPr>
-              <a:t>   Final Prototype / Product – 10/12/2020</a:t>
+              <a:t>   Final Prototype / Product – 15/12/2020</a:t>
             </a:r>
           </a:p>
           <a:p>

</xml_diff>